<commit_message>
Tried using SVM for all featues. Edited presentation a little bit.
</commit_message>
<xml_diff>
--- a/document/595final_v3_fan.pptx
+++ b/document/595final_v3_fan.pptx
@@ -2,25 +2,25 @@
 <file path=ppt/presentation.xml><?xml version="1.0" encoding="utf-8"?>
 <p:presentation xmlns:a="http://schemas.openxmlformats.org/drawingml/2006/main" xmlns:r="http://schemas.openxmlformats.org/officeDocument/2006/relationships" xmlns:p="http://schemas.openxmlformats.org/presentationml/2006/main">
   <p:sldMasterIdLst>
-    <p:sldMasterId id="2147483648" r:id="rId5"/>
+    <p:sldMasterId id="2147483648" r:id="rId1"/>
   </p:sldMasterIdLst>
   <p:notesMasterIdLst>
-    <p:notesMasterId r:id="rId7"/>
+    <p:notesMasterId r:id="rId15"/>
   </p:notesMasterIdLst>
   <p:sldIdLst>
-    <p:sldId id="256" r:id="rId8"/>
-    <p:sldId id="257" r:id="rId9"/>
-    <p:sldId id="258" r:id="rId10"/>
-    <p:sldId id="259" r:id="rId11"/>
-    <p:sldId id="260" r:id="rId12"/>
-    <p:sldId id="261" r:id="rId13"/>
-    <p:sldId id="262" r:id="rId14"/>
-    <p:sldId id="263" r:id="rId15"/>
-    <p:sldId id="264" r:id="rId16"/>
-    <p:sldId id="265" r:id="rId17"/>
-    <p:sldId id="266" r:id="rId18"/>
-    <p:sldId id="267" r:id="rId19"/>
-    <p:sldId id="268" r:id="rId20"/>
+    <p:sldId id="256" r:id="rId2"/>
+    <p:sldId id="258" r:id="rId3"/>
+    <p:sldId id="269" r:id="rId4"/>
+    <p:sldId id="259" r:id="rId5"/>
+    <p:sldId id="260" r:id="rId6"/>
+    <p:sldId id="261" r:id="rId7"/>
+    <p:sldId id="262" r:id="rId8"/>
+    <p:sldId id="263" r:id="rId9"/>
+    <p:sldId id="264" r:id="rId10"/>
+    <p:sldId id="265" r:id="rId11"/>
+    <p:sldId id="266" r:id="rId12"/>
+    <p:sldId id="267" r:id="rId13"/>
+    <p:sldId id="268" r:id="rId14"/>
   </p:sldIdLst>
   <p:sldSz cx="13004800" cy="9753600"/>
   <p:notesSz cx="6858000" cy="9144000"/>
@@ -40,7 +40,7 @@
       <a:buFontTx/>
       <a:buNone/>
       <a:tabLst/>
-      <a:defRPr b="0" baseline="0" cap="none" i="0" spc="0" strike="noStrike" sz="1800" u="none" kumimoji="0" normalizeH="0">
+      <a:defRPr kumimoji="0" sz="1800" b="0" i="0" u="none" strike="noStrike" cap="none" spc="0" normalizeH="0" baseline="0">
         <a:ln>
           <a:noFill/>
         </a:ln>
@@ -66,7 +66,7 @@
       <a:buFontTx/>
       <a:buNone/>
       <a:tabLst/>
-      <a:defRPr b="0" baseline="0" cap="none" i="0" spc="0" strike="noStrike" sz="4200" u="none" kumimoji="0" normalizeH="0">
+      <a:defRPr kumimoji="0" sz="4200" b="0" i="0" u="none" strike="noStrike" cap="none" spc="0" normalizeH="0" baseline="0">
         <a:ln>
           <a:noFill/>
         </a:ln>
@@ -74,7 +74,7 @@
           <a:srgbClr val="FFFFFF"/>
         </a:solidFill>
         <a:effectLst>
-          <a:outerShdw sx="100000" sy="100000" kx="0" ky="0" algn="b" rotWithShape="0" blurRad="50800" dist="38100" dir="5400000">
+          <a:outerShdw blurRad="50800" dist="38100" dir="5400000" rotWithShape="0">
             <a:srgbClr val="000000"/>
           </a:outerShdw>
         </a:effectLst>
@@ -100,7 +100,7 @@
       <a:buFontTx/>
       <a:buNone/>
       <a:tabLst/>
-      <a:defRPr b="0" baseline="0" cap="none" i="0" spc="0" strike="noStrike" sz="4200" u="none" kumimoji="0" normalizeH="0">
+      <a:defRPr kumimoji="0" sz="4200" b="0" i="0" u="none" strike="noStrike" cap="none" spc="0" normalizeH="0" baseline="0">
         <a:ln>
           <a:noFill/>
         </a:ln>
@@ -108,7 +108,7 @@
           <a:srgbClr val="FFFFFF"/>
         </a:solidFill>
         <a:effectLst>
-          <a:outerShdw sx="100000" sy="100000" kx="0" ky="0" algn="b" rotWithShape="0" blurRad="50800" dist="38100" dir="5400000">
+          <a:outerShdw blurRad="50800" dist="38100" dir="5400000" rotWithShape="0">
             <a:srgbClr val="000000"/>
           </a:outerShdw>
         </a:effectLst>
@@ -134,7 +134,7 @@
       <a:buFontTx/>
       <a:buNone/>
       <a:tabLst/>
-      <a:defRPr b="0" baseline="0" cap="none" i="0" spc="0" strike="noStrike" sz="4200" u="none" kumimoji="0" normalizeH="0">
+      <a:defRPr kumimoji="0" sz="4200" b="0" i="0" u="none" strike="noStrike" cap="none" spc="0" normalizeH="0" baseline="0">
         <a:ln>
           <a:noFill/>
         </a:ln>
@@ -142,7 +142,7 @@
           <a:srgbClr val="FFFFFF"/>
         </a:solidFill>
         <a:effectLst>
-          <a:outerShdw sx="100000" sy="100000" kx="0" ky="0" algn="b" rotWithShape="0" blurRad="50800" dist="38100" dir="5400000">
+          <a:outerShdw blurRad="50800" dist="38100" dir="5400000" rotWithShape="0">
             <a:srgbClr val="000000"/>
           </a:outerShdw>
         </a:effectLst>
@@ -168,7 +168,7 @@
       <a:buFontTx/>
       <a:buNone/>
       <a:tabLst/>
-      <a:defRPr b="0" baseline="0" cap="none" i="0" spc="0" strike="noStrike" sz="4200" u="none" kumimoji="0" normalizeH="0">
+      <a:defRPr kumimoji="0" sz="4200" b="0" i="0" u="none" strike="noStrike" cap="none" spc="0" normalizeH="0" baseline="0">
         <a:ln>
           <a:noFill/>
         </a:ln>
@@ -176,7 +176,7 @@
           <a:srgbClr val="FFFFFF"/>
         </a:solidFill>
         <a:effectLst>
-          <a:outerShdw sx="100000" sy="100000" kx="0" ky="0" algn="b" rotWithShape="0" blurRad="50800" dist="38100" dir="5400000">
+          <a:outerShdw blurRad="50800" dist="38100" dir="5400000" rotWithShape="0">
             <a:srgbClr val="000000"/>
           </a:outerShdw>
         </a:effectLst>
@@ -202,7 +202,7 @@
       <a:buFontTx/>
       <a:buNone/>
       <a:tabLst/>
-      <a:defRPr b="0" baseline="0" cap="none" i="0" spc="0" strike="noStrike" sz="4200" u="none" kumimoji="0" normalizeH="0">
+      <a:defRPr kumimoji="0" sz="4200" b="0" i="0" u="none" strike="noStrike" cap="none" spc="0" normalizeH="0" baseline="0">
         <a:ln>
           <a:noFill/>
         </a:ln>
@@ -210,7 +210,7 @@
           <a:srgbClr val="FFFFFF"/>
         </a:solidFill>
         <a:effectLst>
-          <a:outerShdw sx="100000" sy="100000" kx="0" ky="0" algn="b" rotWithShape="0" blurRad="50800" dist="38100" dir="5400000">
+          <a:outerShdw blurRad="50800" dist="38100" dir="5400000" rotWithShape="0">
             <a:srgbClr val="000000"/>
           </a:outerShdw>
         </a:effectLst>
@@ -236,7 +236,7 @@
       <a:buFontTx/>
       <a:buNone/>
       <a:tabLst/>
-      <a:defRPr b="0" baseline="0" cap="none" i="0" spc="0" strike="noStrike" sz="4200" u="none" kumimoji="0" normalizeH="0">
+      <a:defRPr kumimoji="0" sz="4200" b="0" i="0" u="none" strike="noStrike" cap="none" spc="0" normalizeH="0" baseline="0">
         <a:ln>
           <a:noFill/>
         </a:ln>
@@ -244,7 +244,7 @@
           <a:srgbClr val="FFFFFF"/>
         </a:solidFill>
         <a:effectLst>
-          <a:outerShdw sx="100000" sy="100000" kx="0" ky="0" algn="b" rotWithShape="0" blurRad="50800" dist="38100" dir="5400000">
+          <a:outerShdw blurRad="50800" dist="38100" dir="5400000" rotWithShape="0">
             <a:srgbClr val="000000"/>
           </a:outerShdw>
         </a:effectLst>
@@ -270,7 +270,7 @@
       <a:buFontTx/>
       <a:buNone/>
       <a:tabLst/>
-      <a:defRPr b="0" baseline="0" cap="none" i="0" spc="0" strike="noStrike" sz="4200" u="none" kumimoji="0" normalizeH="0">
+      <a:defRPr kumimoji="0" sz="4200" b="0" i="0" u="none" strike="noStrike" cap="none" spc="0" normalizeH="0" baseline="0">
         <a:ln>
           <a:noFill/>
         </a:ln>
@@ -278,7 +278,7 @@
           <a:srgbClr val="FFFFFF"/>
         </a:solidFill>
         <a:effectLst>
-          <a:outerShdw sx="100000" sy="100000" kx="0" ky="0" algn="b" rotWithShape="0" blurRad="50800" dist="38100" dir="5400000">
+          <a:outerShdw blurRad="50800" dist="38100" dir="5400000" rotWithShape="0">
             <a:srgbClr val="000000"/>
           </a:outerShdw>
         </a:effectLst>
@@ -304,7 +304,7 @@
       <a:buFontTx/>
       <a:buNone/>
       <a:tabLst/>
-      <a:defRPr b="0" baseline="0" cap="none" i="0" spc="0" strike="noStrike" sz="4200" u="none" kumimoji="0" normalizeH="0">
+      <a:defRPr kumimoji="0" sz="4200" b="0" i="0" u="none" strike="noStrike" cap="none" spc="0" normalizeH="0" baseline="0">
         <a:ln>
           <a:noFill/>
         </a:ln>
@@ -312,7 +312,7 @@
           <a:srgbClr val="FFFFFF"/>
         </a:solidFill>
         <a:effectLst>
-          <a:outerShdw sx="100000" sy="100000" kx="0" ky="0" algn="b" rotWithShape="0" blurRad="50800" dist="38100" dir="5400000">
+          <a:outerShdw blurRad="50800" dist="38100" dir="5400000" rotWithShape="0">
             <a:srgbClr val="000000"/>
           </a:outerShdw>
         </a:effectLst>
@@ -338,7 +338,7 @@
       <a:buFontTx/>
       <a:buNone/>
       <a:tabLst/>
-      <a:defRPr b="0" baseline="0" cap="none" i="0" spc="0" strike="noStrike" sz="4200" u="none" kumimoji="0" normalizeH="0">
+      <a:defRPr kumimoji="0" sz="4200" b="0" i="0" u="none" strike="noStrike" cap="none" spc="0" normalizeH="0" baseline="0">
         <a:ln>
           <a:noFill/>
         </a:ln>
@@ -346,7 +346,7 @@
           <a:srgbClr val="FFFFFF"/>
         </a:solidFill>
         <a:effectLst>
-          <a:outerShdw sx="100000" sy="100000" kx="0" ky="0" algn="b" rotWithShape="0" blurRad="50800" dist="38100" dir="5400000">
+          <a:outerShdw blurRad="50800" dist="38100" dir="5400000" rotWithShape="0">
             <a:srgbClr val="000000"/>
           </a:outerShdw>
         </a:effectLst>
@@ -361,13 +361,18 @@
 </p:presentation>
 </file>
 
-<file path=ppt/commentAuthors.xml><?xml version="1.0" encoding="utf-8"?>
-<p:cmAuthorLst xmlns:a="http://schemas.openxmlformats.org/drawingml/2006/main" xmlns:r="http://schemas.openxmlformats.org/officeDocument/2006/relationships" xmlns:p="http://schemas.openxmlformats.org/presentationml/2006/main"/>
+<file path=ppt/revisionInfo.xml><?xml version="1.0" encoding="utf-8"?>
+<p1510:revInfo xmlns:a="http://schemas.openxmlformats.org/drawingml/2006/main" xmlns:r="http://schemas.openxmlformats.org/officeDocument/2006/relationships" xmlns:p1510="http://schemas.microsoft.com/office/powerpoint/2015/10/main"/>
 </file>
 
 <file path=ppt/notesMasters/notesMaster1.xml><?xml version="1.0" encoding="utf-8"?>
 <p:notesMaster xmlns:a="http://schemas.openxmlformats.org/drawingml/2006/main" xmlns:r="http://schemas.openxmlformats.org/officeDocument/2006/relationships" xmlns:p="http://schemas.openxmlformats.org/presentationml/2006/main">
   <p:cSld>
+    <p:bg>
+      <p:bgRef idx="1001">
+        <a:schemeClr val="bg1"/>
+      </p:bgRef>
+    </p:bg>
     <p:spTree>
       <p:nvGrpSpPr>
         <p:cNvPr id="1" name=""/>
@@ -385,7 +390,9 @@
       <p:sp>
         <p:nvSpPr>
           <p:cNvPr id="115" name="Shape 115"/>
-          <p:cNvSpPr/>
+          <p:cNvSpPr>
+            <a:spLocks noGrp="1" noRot="1" noChangeAspect="1"/>
+          </p:cNvSpPr>
           <p:nvPr>
             <p:ph type="sldImg"/>
           </p:nvPr>
@@ -403,14 +410,16 @@
           <a:bodyPr/>
           <a:lstStyle/>
           <a:p>
-            <a:pPr/>
+            <a:endParaRPr/>
           </a:p>
         </p:txBody>
       </p:sp>
       <p:sp>
         <p:nvSpPr>
           <p:cNvPr id="116" name="Shape 116"/>
-          <p:cNvSpPr/>
+          <p:cNvSpPr>
+            <a:spLocks noGrp="1"/>
+          </p:cNvSpPr>
           <p:nvPr>
             <p:ph type="body" sz="quarter" idx="1"/>
           </p:nvPr>
@@ -428,7 +437,7 @@
           <a:bodyPr/>
           <a:lstStyle/>
           <a:p>
-            <a:pPr/>
+            <a:endParaRPr/>
           </a:p>
         </p:txBody>
       </p:sp>
@@ -540,7 +549,7 @@
 </file>
 
 <file path=ppt/slideLayouts/slideLayout1.xml><?xml version="1.0" encoding="utf-8"?>
-<p:sldLayout xmlns:a="http://schemas.openxmlformats.org/drawingml/2006/main" xmlns:r="http://schemas.openxmlformats.org/officeDocument/2006/relationships" xmlns:p="http://schemas.openxmlformats.org/presentationml/2006/main" type="title" showMasterSp="1" showMasterPhAnim="1">
+<p:sldLayout xmlns:a="http://schemas.openxmlformats.org/drawingml/2006/main" xmlns:r="http://schemas.openxmlformats.org/officeDocument/2006/relationships" xmlns:p="http://schemas.openxmlformats.org/presentationml/2006/main" type="title">
   <p:cSld name="Title &amp; Subtitle">
     <p:spTree>
       <p:nvGrpSpPr>
@@ -559,7 +568,9 @@
       <p:sp>
         <p:nvSpPr>
           <p:cNvPr id="11" name="Title Text"/>
-          <p:cNvSpPr/>
+          <p:cNvSpPr>
+            <a:spLocks noGrp="1"/>
+          </p:cNvSpPr>
           <p:nvPr>
             <p:ph type="title"/>
           </p:nvPr>
@@ -577,7 +588,6 @@
           <a:bodyPr anchor="b"/>
           <a:lstStyle/>
           <a:p>
-            <a:pPr/>
             <a:r>
               <a:t>Title Text</a:t>
             </a:r>
@@ -587,7 +597,9 @@
       <p:sp>
         <p:nvSpPr>
           <p:cNvPr id="12" name="Body Level One…"/>
-          <p:cNvSpPr/>
+          <p:cNvSpPr>
+            <a:spLocks noGrp="1"/>
+          </p:cNvSpPr>
           <p:nvPr>
             <p:ph type="body" sz="quarter" idx="1"/>
           </p:nvPr>
@@ -666,7 +678,6 @@
             </a:lvl5pPr>
           </a:lstStyle>
           <a:p>
-            <a:pPr/>
             <a:r>
               <a:t>Body Level One</a:t>
             </a:r>
@@ -700,7 +711,9 @@
       <p:sp>
         <p:nvSpPr>
           <p:cNvPr id="13" name="Slide Number"/>
-          <p:cNvSpPr/>
+          <p:cNvSpPr>
+            <a:spLocks noGrp="1"/>
+          </p:cNvSpPr>
           <p:nvPr>
             <p:ph type="sldNum" sz="quarter" idx="2"/>
           </p:nvPr>
@@ -719,7 +732,10 @@
                 <a:effectLst/>
               </a:defRPr>
             </a:pPr>
-            <a:fld id="{86CB4B4D-7CA3-9044-876B-883B54F8677D}" type="slidenum"/>
+            <a:fld id="{86CB4B4D-7CA3-9044-876B-883B54F8677D}" type="slidenum">
+              <a:t>‹#›</a:t>
+            </a:fld>
+            <a:endParaRPr/>
           </a:p>
         </p:txBody>
       </p:sp>
@@ -728,165 +744,12 @@
   <p:clrMapOvr>
     <a:masterClrMapping/>
   </p:clrMapOvr>
-  <p:transition xmlns:p14="http://schemas.microsoft.com/office/powerpoint/2010/main" spd="med" advClick="1"/>
+  <p:transition spd="med"/>
 </p:sldLayout>
 </file>
 
 <file path=ppt/slideLayouts/slideLayout10.xml><?xml version="1.0" encoding="utf-8"?>
-<p:sldLayout xmlns:a="http://schemas.openxmlformats.org/drawingml/2006/main" xmlns:r="http://schemas.openxmlformats.org/officeDocument/2006/relationships" xmlns:p="http://schemas.openxmlformats.org/presentationml/2006/main" type="tx" showMasterSp="1" showMasterPhAnim="1">
-  <p:cSld name="Quote">
-    <p:spTree>
-      <p:nvGrpSpPr>
-        <p:cNvPr id="1" name=""/>
-        <p:cNvGrpSpPr/>
-        <p:nvPr/>
-      </p:nvGrpSpPr>
-      <p:grpSpPr>
-        <a:xfrm>
-          <a:off x="0" y="0"/>
-          <a:ext cx="0" cy="0"/>
-          <a:chOff x="0" y="0"/>
-          <a:chExt cx="0" cy="0"/>
-        </a:xfrm>
-      </p:grpSpPr>
-      <p:sp>
-        <p:nvSpPr>
-          <p:cNvPr id="92" name="–Johnny Appleseed"/>
-          <p:cNvSpPr/>
-          <p:nvPr>
-            <p:ph type="body" sz="quarter" idx="13"/>
-          </p:nvPr>
-        </p:nvSpPr>
-        <p:spPr>
-          <a:xfrm>
-            <a:off x="1270000" y="6362700"/>
-            <a:ext cx="10464800" cy="461366"/>
-          </a:xfrm>
-          <a:prstGeom prst="rect">
-            <a:avLst/>
-          </a:prstGeom>
-        </p:spPr>
-        <p:txBody>
-          <a:bodyPr anchor="t">
-            <a:spAutoFit/>
-          </a:bodyPr>
-          <a:lstStyle>
-            <a:lvl1pPr marL="0" indent="0" algn="ctr">
-              <a:spcBef>
-                <a:spcPts val="0"/>
-              </a:spcBef>
-              <a:buSzTx/>
-              <a:buNone/>
-              <a:defRPr i="1" sz="2400">
-                <a:solidFill>
-                  <a:srgbClr val="73BFFF"/>
-                </a:solidFill>
-                <a:effectLst>
-                  <a:outerShdw sx="100000" sy="100000" kx="0" ky="0" algn="b" rotWithShape="0" blurRad="38100" dist="36285" dir="2700000">
-                    <a:srgbClr val="000000">
-                      <a:alpha val="48000"/>
-                    </a:srgbClr>
-                  </a:outerShdw>
-                </a:effectLst>
-                <a:latin typeface="Helvetica Neue"/>
-                <a:ea typeface="Helvetica Neue"/>
-                <a:cs typeface="Helvetica Neue"/>
-                <a:sym typeface="Helvetica Neue"/>
-              </a:defRPr>
-            </a:lvl1pPr>
-          </a:lstStyle>
-          <a:p>
-            <a:pPr/>
-            <a:r>
-              <a:t>–Johnny Appleseed</a:t>
-            </a:r>
-          </a:p>
-        </p:txBody>
-      </p:sp>
-      <p:sp>
-        <p:nvSpPr>
-          <p:cNvPr id="93" name="“Type a quote here.”"/>
-          <p:cNvSpPr/>
-          <p:nvPr>
-            <p:ph type="body" sz="quarter" idx="14"/>
-          </p:nvPr>
-        </p:nvSpPr>
-        <p:spPr>
-          <a:xfrm>
-            <a:off x="1270000" y="4267200"/>
-            <a:ext cx="10464800" cy="647700"/>
-          </a:xfrm>
-          <a:prstGeom prst="rect">
-            <a:avLst/>
-          </a:prstGeom>
-        </p:spPr>
-        <p:txBody>
-          <a:bodyPr>
-            <a:spAutoFit/>
-          </a:bodyPr>
-          <a:lstStyle>
-            <a:lvl1pPr marL="0" indent="0" algn="ctr">
-              <a:spcBef>
-                <a:spcPts val="0"/>
-              </a:spcBef>
-              <a:buSzTx/>
-              <a:buNone/>
-              <a:defRPr>
-                <a:effectLst>
-                  <a:outerShdw sx="100000" sy="100000" kx="0" ky="0" algn="b" rotWithShape="0" blurRad="38100" dist="54428" dir="2700000">
-                    <a:srgbClr val="000000">
-                      <a:alpha val="48000"/>
-                    </a:srgbClr>
-                  </a:outerShdw>
-                </a:effectLst>
-              </a:defRPr>
-            </a:lvl1pPr>
-          </a:lstStyle>
-          <a:p>
-            <a:pPr/>
-            <a:r>
-              <a:t>“Type a quote here.” </a:t>
-            </a:r>
-          </a:p>
-        </p:txBody>
-      </p:sp>
-      <p:sp>
-        <p:nvSpPr>
-          <p:cNvPr id="94" name="Slide Number"/>
-          <p:cNvSpPr/>
-          <p:nvPr>
-            <p:ph type="sldNum" sz="quarter" idx="2"/>
-          </p:nvPr>
-        </p:nvSpPr>
-        <p:spPr>
-          <a:prstGeom prst="rect">
-            <a:avLst/>
-          </a:prstGeom>
-        </p:spPr>
-        <p:txBody>
-          <a:bodyPr/>
-          <a:lstStyle/>
-          <a:p>
-            <a:pPr>
-              <a:defRPr>
-                <a:effectLst/>
-              </a:defRPr>
-            </a:pPr>
-            <a:fld id="{86CB4B4D-7CA3-9044-876B-883B54F8677D}" type="slidenum"/>
-          </a:p>
-        </p:txBody>
-      </p:sp>
-    </p:spTree>
-  </p:cSld>
-  <p:clrMapOvr>
-    <a:masterClrMapping/>
-  </p:clrMapOvr>
-  <p:transition xmlns:p14="http://schemas.microsoft.com/office/powerpoint/2010/main" spd="med" advClick="1"/>
-</p:sldLayout>
-</file>
-
-<file path=ppt/slideLayouts/slideLayout11.xml><?xml version="1.0" encoding="utf-8"?>
-<p:sldLayout xmlns:a="http://schemas.openxmlformats.org/drawingml/2006/main" xmlns:r="http://schemas.openxmlformats.org/officeDocument/2006/relationships" xmlns:p="http://schemas.openxmlformats.org/presentationml/2006/main" type="tx" showMasterSp="1" showMasterPhAnim="1">
+<p:sldLayout xmlns:a="http://schemas.openxmlformats.org/drawingml/2006/main" xmlns:r="http://schemas.openxmlformats.org/officeDocument/2006/relationships" xmlns:p="http://schemas.openxmlformats.org/presentationml/2006/main" type="tx">
   <p:cSld name="Photo">
     <p:spTree>
       <p:nvGrpSpPr>
@@ -905,7 +768,9 @@
       <p:sp>
         <p:nvSpPr>
           <p:cNvPr id="101" name="Image"/>
-          <p:cNvSpPr/>
+          <p:cNvSpPr>
+            <a:spLocks noGrp="1"/>
+          </p:cNvSpPr>
           <p:nvPr>
             <p:ph type="pic" idx="13"/>
           </p:nvPr>
@@ -925,14 +790,16 @@
           </a:bodyPr>
           <a:lstStyle/>
           <a:p>
-            <a:pPr/>
+            <a:endParaRPr/>
           </a:p>
         </p:txBody>
       </p:sp>
       <p:sp>
         <p:nvSpPr>
           <p:cNvPr id="102" name="Slide Number"/>
-          <p:cNvSpPr/>
+          <p:cNvSpPr>
+            <a:spLocks noGrp="1"/>
+          </p:cNvSpPr>
           <p:nvPr>
             <p:ph type="sldNum" sz="quarter" idx="2"/>
           </p:nvPr>
@@ -951,7 +818,10 @@
                 <a:effectLst/>
               </a:defRPr>
             </a:pPr>
-            <a:fld id="{86CB4B4D-7CA3-9044-876B-883B54F8677D}" type="slidenum"/>
+            <a:fld id="{86CB4B4D-7CA3-9044-876B-883B54F8677D}" type="slidenum">
+              <a:t>‹#›</a:t>
+            </a:fld>
+            <a:endParaRPr/>
           </a:p>
         </p:txBody>
       </p:sp>
@@ -960,12 +830,12 @@
   <p:clrMapOvr>
     <a:masterClrMapping/>
   </p:clrMapOvr>
-  <p:transition xmlns:p14="http://schemas.microsoft.com/office/powerpoint/2010/main" spd="med" advClick="1"/>
+  <p:transition spd="med"/>
 </p:sldLayout>
 </file>
 
-<file path=ppt/slideLayouts/slideLayout12.xml><?xml version="1.0" encoding="utf-8"?>
-<p:sldLayout xmlns:a="http://schemas.openxmlformats.org/drawingml/2006/main" xmlns:r="http://schemas.openxmlformats.org/officeDocument/2006/relationships" xmlns:p="http://schemas.openxmlformats.org/presentationml/2006/main" type="tx" showMasterSp="1" showMasterPhAnim="1">
+<file path=ppt/slideLayouts/slideLayout11.xml><?xml version="1.0" encoding="utf-8"?>
+<p:sldLayout xmlns:a="http://schemas.openxmlformats.org/drawingml/2006/main" xmlns:r="http://schemas.openxmlformats.org/officeDocument/2006/relationships" xmlns:p="http://schemas.openxmlformats.org/presentationml/2006/main" type="tx">
   <p:cSld name="Blank">
     <p:spTree>
       <p:nvGrpSpPr>
@@ -984,7 +854,9 @@
       <p:sp>
         <p:nvSpPr>
           <p:cNvPr id="109" name="Slide Number"/>
-          <p:cNvSpPr/>
+          <p:cNvSpPr>
+            <a:spLocks noGrp="1"/>
+          </p:cNvSpPr>
           <p:nvPr>
             <p:ph type="sldNum" sz="quarter" idx="2"/>
           </p:nvPr>
@@ -1003,7 +875,10 @@
                 <a:effectLst/>
               </a:defRPr>
             </a:pPr>
-            <a:fld id="{86CB4B4D-7CA3-9044-876B-883B54F8677D}" type="slidenum"/>
+            <a:fld id="{86CB4B4D-7CA3-9044-876B-883B54F8677D}" type="slidenum">
+              <a:t>‹#›</a:t>
+            </a:fld>
+            <a:endParaRPr/>
           </a:p>
         </p:txBody>
       </p:sp>
@@ -1012,12 +887,12 @@
   <p:clrMapOvr>
     <a:masterClrMapping/>
   </p:clrMapOvr>
-  <p:transition xmlns:p14="http://schemas.microsoft.com/office/powerpoint/2010/main" spd="med" advClick="1"/>
+  <p:transition spd="med"/>
 </p:sldLayout>
 </file>
 
 <file path=ppt/slideLayouts/slideLayout2.xml><?xml version="1.0" encoding="utf-8"?>
-<p:sldLayout xmlns:a="http://schemas.openxmlformats.org/drawingml/2006/main" xmlns:r="http://schemas.openxmlformats.org/officeDocument/2006/relationships" xmlns:p="http://schemas.openxmlformats.org/presentationml/2006/main" type="tx" showMasterSp="1" showMasterPhAnim="1">
+<p:sldLayout xmlns:a="http://schemas.openxmlformats.org/drawingml/2006/main" xmlns:r="http://schemas.openxmlformats.org/officeDocument/2006/relationships" xmlns:p="http://schemas.openxmlformats.org/presentationml/2006/main" type="tx">
   <p:cSld name="Photo - Horizontal">
     <p:spTree>
       <p:nvGrpSpPr>
@@ -1036,7 +911,9 @@
       <p:sp>
         <p:nvSpPr>
           <p:cNvPr id="20" name="Image"/>
-          <p:cNvSpPr/>
+          <p:cNvSpPr>
+            <a:spLocks noGrp="1"/>
+          </p:cNvSpPr>
           <p:nvPr>
             <p:ph type="pic" idx="13"/>
           </p:nvPr>
@@ -1059,14 +936,16 @@
           </a:bodyPr>
           <a:lstStyle/>
           <a:p>
-            <a:pPr/>
+            <a:endParaRPr/>
           </a:p>
         </p:txBody>
       </p:sp>
       <p:sp>
         <p:nvSpPr>
           <p:cNvPr id="21" name="Title Text"/>
-          <p:cNvSpPr/>
+          <p:cNvSpPr>
+            <a:spLocks noGrp="1"/>
+          </p:cNvSpPr>
           <p:nvPr>
             <p:ph type="title"/>
           </p:nvPr>
@@ -1084,7 +963,6 @@
           <a:bodyPr anchor="b"/>
           <a:lstStyle/>
           <a:p>
-            <a:pPr/>
             <a:r>
               <a:t>Title Text</a:t>
             </a:r>
@@ -1094,7 +972,9 @@
       <p:sp>
         <p:nvSpPr>
           <p:cNvPr id="22" name="Slide Number"/>
-          <p:cNvSpPr/>
+          <p:cNvSpPr>
+            <a:spLocks noGrp="1"/>
+          </p:cNvSpPr>
           <p:nvPr>
             <p:ph type="sldNum" sz="quarter" idx="2"/>
           </p:nvPr>
@@ -1113,7 +993,10 @@
                 <a:effectLst/>
               </a:defRPr>
             </a:pPr>
-            <a:fld id="{86CB4B4D-7CA3-9044-876B-883B54F8677D}" type="slidenum"/>
+            <a:fld id="{86CB4B4D-7CA3-9044-876B-883B54F8677D}" type="slidenum">
+              <a:t>‹#›</a:t>
+            </a:fld>
+            <a:endParaRPr/>
           </a:p>
         </p:txBody>
       </p:sp>
@@ -1122,12 +1005,12 @@
   <p:clrMapOvr>
     <a:masterClrMapping/>
   </p:clrMapOvr>
-  <p:transition xmlns:p14="http://schemas.microsoft.com/office/powerpoint/2010/main" spd="med" advClick="1"/>
+  <p:transition spd="med"/>
 </p:sldLayout>
 </file>
 
 <file path=ppt/slideLayouts/slideLayout3.xml><?xml version="1.0" encoding="utf-8"?>
-<p:sldLayout xmlns:a="http://schemas.openxmlformats.org/drawingml/2006/main" xmlns:r="http://schemas.openxmlformats.org/officeDocument/2006/relationships" xmlns:p="http://schemas.openxmlformats.org/presentationml/2006/main" type="tx" showMasterSp="1" showMasterPhAnim="1">
+<p:sldLayout xmlns:a="http://schemas.openxmlformats.org/drawingml/2006/main" xmlns:r="http://schemas.openxmlformats.org/officeDocument/2006/relationships" xmlns:p="http://schemas.openxmlformats.org/presentationml/2006/main" type="tx">
   <p:cSld name="Title - Center">
     <p:spTree>
       <p:nvGrpSpPr>
@@ -1146,7 +1029,9 @@
       <p:sp>
         <p:nvSpPr>
           <p:cNvPr id="29" name="Title Text"/>
-          <p:cNvSpPr/>
+          <p:cNvSpPr>
+            <a:spLocks noGrp="1"/>
+          </p:cNvSpPr>
           <p:nvPr>
             <p:ph type="title"/>
           </p:nvPr>
@@ -1164,7 +1049,6 @@
           <a:bodyPr/>
           <a:lstStyle/>
           <a:p>
-            <a:pPr/>
             <a:r>
               <a:t>Title Text</a:t>
             </a:r>
@@ -1174,7 +1058,9 @@
       <p:sp>
         <p:nvSpPr>
           <p:cNvPr id="30" name="Slide Number"/>
-          <p:cNvSpPr/>
+          <p:cNvSpPr>
+            <a:spLocks noGrp="1"/>
+          </p:cNvSpPr>
           <p:nvPr>
             <p:ph type="sldNum" sz="quarter" idx="2"/>
           </p:nvPr>
@@ -1193,7 +1079,10 @@
                 <a:effectLst/>
               </a:defRPr>
             </a:pPr>
-            <a:fld id="{86CB4B4D-7CA3-9044-876B-883B54F8677D}" type="slidenum"/>
+            <a:fld id="{86CB4B4D-7CA3-9044-876B-883B54F8677D}" type="slidenum">
+              <a:t>‹#›</a:t>
+            </a:fld>
+            <a:endParaRPr/>
           </a:p>
         </p:txBody>
       </p:sp>
@@ -1202,12 +1091,12 @@
   <p:clrMapOvr>
     <a:masterClrMapping/>
   </p:clrMapOvr>
-  <p:transition xmlns:p14="http://schemas.microsoft.com/office/powerpoint/2010/main" spd="med" advClick="1"/>
+  <p:transition spd="med"/>
 </p:sldLayout>
 </file>
 
 <file path=ppt/slideLayouts/slideLayout4.xml><?xml version="1.0" encoding="utf-8"?>
-<p:sldLayout xmlns:a="http://schemas.openxmlformats.org/drawingml/2006/main" xmlns:r="http://schemas.openxmlformats.org/officeDocument/2006/relationships" xmlns:p="http://schemas.openxmlformats.org/presentationml/2006/main" type="tx" showMasterSp="1" showMasterPhAnim="1">
+<p:sldLayout xmlns:a="http://schemas.openxmlformats.org/drawingml/2006/main" xmlns:r="http://schemas.openxmlformats.org/officeDocument/2006/relationships" xmlns:p="http://schemas.openxmlformats.org/presentationml/2006/main" type="tx">
   <p:cSld name="Photo - Vertical">
     <p:spTree>
       <p:nvGrpSpPr>
@@ -1226,7 +1115,9 @@
       <p:sp>
         <p:nvSpPr>
           <p:cNvPr id="37" name="Image"/>
-          <p:cNvSpPr/>
+          <p:cNvSpPr>
+            <a:spLocks noGrp="1"/>
+          </p:cNvSpPr>
           <p:nvPr>
             <p:ph type="pic" sz="half" idx="13"/>
           </p:nvPr>
@@ -1249,14 +1140,16 @@
           </a:bodyPr>
           <a:lstStyle/>
           <a:p>
-            <a:pPr/>
+            <a:endParaRPr/>
           </a:p>
         </p:txBody>
       </p:sp>
       <p:sp>
         <p:nvSpPr>
           <p:cNvPr id="38" name="Title Text"/>
-          <p:cNvSpPr/>
+          <p:cNvSpPr>
+            <a:spLocks noGrp="1"/>
+          </p:cNvSpPr>
           <p:nvPr>
             <p:ph type="title"/>
           </p:nvPr>
@@ -1274,7 +1167,6 @@
           <a:bodyPr anchor="b"/>
           <a:lstStyle/>
           <a:p>
-            <a:pPr/>
             <a:r>
               <a:t>Title Text</a:t>
             </a:r>
@@ -1284,7 +1176,9 @@
       <p:sp>
         <p:nvSpPr>
           <p:cNvPr id="39" name="Body Level One…"/>
-          <p:cNvSpPr/>
+          <p:cNvSpPr>
+            <a:spLocks noGrp="1"/>
+          </p:cNvSpPr>
           <p:nvPr>
             <p:ph type="body" sz="quarter" idx="1"/>
           </p:nvPr>
@@ -1363,7 +1257,6 @@
             </a:lvl5pPr>
           </a:lstStyle>
           <a:p>
-            <a:pPr/>
             <a:r>
               <a:t>Body Level One</a:t>
             </a:r>
@@ -1397,7 +1290,9 @@
       <p:sp>
         <p:nvSpPr>
           <p:cNvPr id="40" name="Slide Number"/>
-          <p:cNvSpPr/>
+          <p:cNvSpPr>
+            <a:spLocks noGrp="1"/>
+          </p:cNvSpPr>
           <p:nvPr>
             <p:ph type="sldNum" sz="quarter" idx="2"/>
           </p:nvPr>
@@ -1416,7 +1311,10 @@
                 <a:effectLst/>
               </a:defRPr>
             </a:pPr>
-            <a:fld id="{86CB4B4D-7CA3-9044-876B-883B54F8677D}" type="slidenum"/>
+            <a:fld id="{86CB4B4D-7CA3-9044-876B-883B54F8677D}" type="slidenum">
+              <a:t>‹#›</a:t>
+            </a:fld>
+            <a:endParaRPr/>
           </a:p>
         </p:txBody>
       </p:sp>
@@ -1425,12 +1323,12 @@
   <p:clrMapOvr>
     <a:masterClrMapping/>
   </p:clrMapOvr>
-  <p:transition xmlns:p14="http://schemas.microsoft.com/office/powerpoint/2010/main" spd="med" advClick="1"/>
+  <p:transition spd="med"/>
 </p:sldLayout>
 </file>
 
 <file path=ppt/slideLayouts/slideLayout5.xml><?xml version="1.0" encoding="utf-8"?>
-<p:sldLayout xmlns:a="http://schemas.openxmlformats.org/drawingml/2006/main" xmlns:r="http://schemas.openxmlformats.org/officeDocument/2006/relationships" xmlns:p="http://schemas.openxmlformats.org/presentationml/2006/main" type="tx" showMasterSp="1" showMasterPhAnim="1">
+<p:sldLayout xmlns:a="http://schemas.openxmlformats.org/drawingml/2006/main" xmlns:r="http://schemas.openxmlformats.org/officeDocument/2006/relationships" xmlns:p="http://schemas.openxmlformats.org/presentationml/2006/main" type="tx">
   <p:cSld name="Title - Top">
     <p:spTree>
       <p:nvGrpSpPr>
@@ -1449,7 +1347,9 @@
       <p:sp>
         <p:nvSpPr>
           <p:cNvPr id="47" name="Title Text"/>
-          <p:cNvSpPr/>
+          <p:cNvSpPr>
+            <a:spLocks noGrp="1"/>
+          </p:cNvSpPr>
           <p:nvPr>
             <p:ph type="title"/>
           </p:nvPr>
@@ -1463,7 +1363,6 @@
           <a:bodyPr/>
           <a:lstStyle/>
           <a:p>
-            <a:pPr/>
             <a:r>
               <a:t>Title Text</a:t>
             </a:r>
@@ -1473,7 +1372,9 @@
       <p:sp>
         <p:nvSpPr>
           <p:cNvPr id="48" name="Slide Number"/>
-          <p:cNvSpPr/>
+          <p:cNvSpPr>
+            <a:spLocks noGrp="1"/>
+          </p:cNvSpPr>
           <p:nvPr>
             <p:ph type="sldNum" sz="quarter" idx="2"/>
           </p:nvPr>
@@ -1492,7 +1393,10 @@
                 <a:effectLst/>
               </a:defRPr>
             </a:pPr>
-            <a:fld id="{86CB4B4D-7CA3-9044-876B-883B54F8677D}" type="slidenum"/>
+            <a:fld id="{86CB4B4D-7CA3-9044-876B-883B54F8677D}" type="slidenum">
+              <a:t>‹#›</a:t>
+            </a:fld>
+            <a:endParaRPr/>
           </a:p>
         </p:txBody>
       </p:sp>
@@ -1501,166 +1405,12 @@
   <p:clrMapOvr>
     <a:masterClrMapping/>
   </p:clrMapOvr>
-  <p:transition xmlns:p14="http://schemas.microsoft.com/office/powerpoint/2010/main" spd="med" advClick="1"/>
+  <p:transition spd="med"/>
 </p:sldLayout>
 </file>
 
 <file path=ppt/slideLayouts/slideLayout6.xml><?xml version="1.0" encoding="utf-8"?>
-<p:sldLayout xmlns:a="http://schemas.openxmlformats.org/drawingml/2006/main" xmlns:r="http://schemas.openxmlformats.org/officeDocument/2006/relationships" xmlns:p="http://schemas.openxmlformats.org/presentationml/2006/main" type="tx" showMasterSp="1" showMasterPhAnim="1">
-  <p:cSld name="Title &amp; Bullets">
-    <p:spTree>
-      <p:nvGrpSpPr>
-        <p:cNvPr id="1" name=""/>
-        <p:cNvGrpSpPr/>
-        <p:nvPr/>
-      </p:nvGrpSpPr>
-      <p:grpSpPr>
-        <a:xfrm>
-          <a:off x="0" y="0"/>
-          <a:ext cx="0" cy="0"/>
-          <a:chOff x="0" y="0"/>
-          <a:chExt cx="0" cy="0"/>
-        </a:xfrm>
-      </p:grpSpPr>
-      <p:sp>
-        <p:nvSpPr>
-          <p:cNvPr id="55" name="Title Text"/>
-          <p:cNvSpPr/>
-          <p:nvPr>
-            <p:ph type="title"/>
-          </p:nvPr>
-        </p:nvSpPr>
-        <p:spPr>
-          <a:prstGeom prst="rect">
-            <a:avLst/>
-          </a:prstGeom>
-        </p:spPr>
-        <p:txBody>
-          <a:bodyPr/>
-          <a:lstStyle/>
-          <a:p>
-            <a:pPr/>
-            <a:r>
-              <a:t>Title Text</a:t>
-            </a:r>
-          </a:p>
-        </p:txBody>
-      </p:sp>
-      <p:sp>
-        <p:nvSpPr>
-          <p:cNvPr id="56" name="Body Level One…"/>
-          <p:cNvSpPr/>
-          <p:nvPr>
-            <p:ph type="body" idx="1"/>
-          </p:nvPr>
-        </p:nvSpPr>
-        <p:spPr>
-          <a:xfrm>
-            <a:off x="787400" y="2768600"/>
-            <a:ext cx="11430000" cy="5715000"/>
-          </a:xfrm>
-          <a:prstGeom prst="rect">
-            <a:avLst/>
-          </a:prstGeom>
-        </p:spPr>
-        <p:txBody>
-          <a:bodyPr/>
-          <a:lstStyle>
-            <a:lvl1pPr>
-              <a:buBlip>
-                <a:blip r:embed="rId2"/>
-              </a:buBlip>
-            </a:lvl1pPr>
-            <a:lvl2pPr>
-              <a:buBlip>
-                <a:blip r:embed="rId2"/>
-              </a:buBlip>
-            </a:lvl2pPr>
-            <a:lvl3pPr>
-              <a:buBlip>
-                <a:blip r:embed="rId2"/>
-              </a:buBlip>
-            </a:lvl3pPr>
-            <a:lvl4pPr>
-              <a:buBlip>
-                <a:blip r:embed="rId2"/>
-              </a:buBlip>
-            </a:lvl4pPr>
-            <a:lvl5pPr>
-              <a:buBlip>
-                <a:blip r:embed="rId2"/>
-              </a:buBlip>
-            </a:lvl5pPr>
-          </a:lstStyle>
-          <a:p>
-            <a:pPr/>
-            <a:r>
-              <a:t>Body Level One</a:t>
-            </a:r>
-          </a:p>
-          <a:p>
-            <a:pPr lvl="1"/>
-            <a:r>
-              <a:t>Body Level Two</a:t>
-            </a:r>
-          </a:p>
-          <a:p>
-            <a:pPr lvl="2"/>
-            <a:r>
-              <a:t>Body Level Three</a:t>
-            </a:r>
-          </a:p>
-          <a:p>
-            <a:pPr lvl="3"/>
-            <a:r>
-              <a:t>Body Level Four</a:t>
-            </a:r>
-          </a:p>
-          <a:p>
-            <a:pPr lvl="4"/>
-            <a:r>
-              <a:t>Body Level Five</a:t>
-            </a:r>
-          </a:p>
-        </p:txBody>
-      </p:sp>
-      <p:sp>
-        <p:nvSpPr>
-          <p:cNvPr id="57" name="Slide Number"/>
-          <p:cNvSpPr/>
-          <p:nvPr>
-            <p:ph type="sldNum" sz="quarter" idx="2"/>
-          </p:nvPr>
-        </p:nvSpPr>
-        <p:spPr>
-          <a:prstGeom prst="rect">
-            <a:avLst/>
-          </a:prstGeom>
-        </p:spPr>
-        <p:txBody>
-          <a:bodyPr/>
-          <a:lstStyle/>
-          <a:p>
-            <a:pPr>
-              <a:defRPr>
-                <a:effectLst/>
-              </a:defRPr>
-            </a:pPr>
-            <a:fld id="{86CB4B4D-7CA3-9044-876B-883B54F8677D}" type="slidenum"/>
-          </a:p>
-        </p:txBody>
-      </p:sp>
-    </p:spTree>
-  </p:cSld>
-  <p:clrMapOvr>
-    <a:masterClrMapping/>
-  </p:clrMapOvr>
-  <p:transition xmlns:p14="http://schemas.microsoft.com/office/powerpoint/2010/main" spd="med" advClick="1"/>
-</p:sldLayout>
-</file>
-
-<file path=ppt/slideLayouts/slideLayout7.xml><?xml version="1.0" encoding="utf-8"?>
-<p:sldLayout xmlns:a="http://schemas.openxmlformats.org/drawingml/2006/main" xmlns:r="http://schemas.openxmlformats.org/officeDocument/2006/relationships" xmlns:p="http://schemas.openxmlformats.org/presentationml/2006/main" type="tx" showMasterSp="1" showMasterPhAnim="1">
+<p:sldLayout xmlns:a="http://schemas.openxmlformats.org/drawingml/2006/main" xmlns:r="http://schemas.openxmlformats.org/officeDocument/2006/relationships" xmlns:p="http://schemas.openxmlformats.org/presentationml/2006/main" type="tx">
   <p:cSld name="Title, Bullets &amp; Photo">
     <p:spTree>
       <p:nvGrpSpPr>
@@ -1679,7 +1429,9 @@
       <p:sp>
         <p:nvSpPr>
           <p:cNvPr id="64" name="Image"/>
-          <p:cNvSpPr/>
+          <p:cNvSpPr>
+            <a:spLocks noGrp="1"/>
+          </p:cNvSpPr>
           <p:nvPr>
             <p:ph type="pic" sz="half" idx="13"/>
           </p:nvPr>
@@ -1702,14 +1454,16 @@
           </a:bodyPr>
           <a:lstStyle/>
           <a:p>
-            <a:pPr/>
+            <a:endParaRPr/>
           </a:p>
         </p:txBody>
       </p:sp>
       <p:sp>
         <p:nvSpPr>
           <p:cNvPr id="65" name="Title Text"/>
-          <p:cNvSpPr/>
+          <p:cNvSpPr>
+            <a:spLocks noGrp="1"/>
+          </p:cNvSpPr>
           <p:nvPr>
             <p:ph type="title"/>
           </p:nvPr>
@@ -1723,7 +1477,6 @@
           <a:bodyPr/>
           <a:lstStyle/>
           <a:p>
-            <a:pPr/>
             <a:r>
               <a:t>Title Text</a:t>
             </a:r>
@@ -1733,7 +1486,9 @@
       <p:sp>
         <p:nvSpPr>
           <p:cNvPr id="66" name="Body Level One…"/>
-          <p:cNvSpPr/>
+          <p:cNvSpPr>
+            <a:spLocks noGrp="1"/>
+          </p:cNvSpPr>
           <p:nvPr>
             <p:ph type="body" sz="half" idx="1"/>
           </p:nvPr>
@@ -1777,7 +1532,6 @@
             </a:lvl5pPr>
           </a:lstStyle>
           <a:p>
-            <a:pPr/>
             <a:r>
               <a:t>Body Level One</a:t>
             </a:r>
@@ -1811,7 +1565,9 @@
       <p:sp>
         <p:nvSpPr>
           <p:cNvPr id="67" name="Slide Number"/>
-          <p:cNvSpPr/>
+          <p:cNvSpPr>
+            <a:spLocks noGrp="1"/>
+          </p:cNvSpPr>
           <p:nvPr>
             <p:ph type="sldNum" sz="quarter" idx="2"/>
           </p:nvPr>
@@ -1830,7 +1586,10 @@
                 <a:effectLst/>
               </a:defRPr>
             </a:pPr>
-            <a:fld id="{86CB4B4D-7CA3-9044-876B-883B54F8677D}" type="slidenum"/>
+            <a:fld id="{86CB4B4D-7CA3-9044-876B-883B54F8677D}" type="slidenum">
+              <a:t>‹#›</a:t>
+            </a:fld>
+            <a:endParaRPr/>
           </a:p>
         </p:txBody>
       </p:sp>
@@ -1839,12 +1598,12 @@
   <p:clrMapOvr>
     <a:masterClrMapping/>
   </p:clrMapOvr>
-  <p:transition xmlns:p14="http://schemas.microsoft.com/office/powerpoint/2010/main" spd="med" advClick="1"/>
+  <p:transition spd="med"/>
 </p:sldLayout>
 </file>
 
-<file path=ppt/slideLayouts/slideLayout8.xml><?xml version="1.0" encoding="utf-8"?>
-<p:sldLayout xmlns:a="http://schemas.openxmlformats.org/drawingml/2006/main" xmlns:r="http://schemas.openxmlformats.org/officeDocument/2006/relationships" xmlns:p="http://schemas.openxmlformats.org/presentationml/2006/main" type="tx" showMasterSp="1" showMasterPhAnim="1">
+<file path=ppt/slideLayouts/slideLayout7.xml><?xml version="1.0" encoding="utf-8"?>
+<p:sldLayout xmlns:a="http://schemas.openxmlformats.org/drawingml/2006/main" xmlns:r="http://schemas.openxmlformats.org/officeDocument/2006/relationships" xmlns:p="http://schemas.openxmlformats.org/presentationml/2006/main" type="tx">
   <p:cSld name="Bullets">
     <p:spTree>
       <p:nvGrpSpPr>
@@ -1863,7 +1622,9 @@
       <p:sp>
         <p:nvSpPr>
           <p:cNvPr id="74" name="Body Level One…"/>
-          <p:cNvSpPr/>
+          <p:cNvSpPr>
+            <a:spLocks noGrp="1"/>
+          </p:cNvSpPr>
           <p:nvPr>
             <p:ph type="body" idx="1"/>
           </p:nvPr>
@@ -1903,7 +1664,6 @@
             </a:lvl5pPr>
           </a:lstStyle>
           <a:p>
-            <a:pPr/>
             <a:r>
               <a:t>Body Level One</a:t>
             </a:r>
@@ -1937,7 +1697,9 @@
       <p:sp>
         <p:nvSpPr>
           <p:cNvPr id="75" name="Slide Number"/>
-          <p:cNvSpPr/>
+          <p:cNvSpPr>
+            <a:spLocks noGrp="1"/>
+          </p:cNvSpPr>
           <p:nvPr>
             <p:ph type="sldNum" sz="quarter" idx="2"/>
           </p:nvPr>
@@ -1956,7 +1718,10 @@
                 <a:effectLst/>
               </a:defRPr>
             </a:pPr>
-            <a:fld id="{86CB4B4D-7CA3-9044-876B-883B54F8677D}" type="slidenum"/>
+            <a:fld id="{86CB4B4D-7CA3-9044-876B-883B54F8677D}" type="slidenum">
+              <a:t>‹#›</a:t>
+            </a:fld>
+            <a:endParaRPr/>
           </a:p>
         </p:txBody>
       </p:sp>
@@ -1965,12 +1730,12 @@
   <p:clrMapOvr>
     <a:masterClrMapping/>
   </p:clrMapOvr>
-  <p:transition xmlns:p14="http://schemas.microsoft.com/office/powerpoint/2010/main" spd="med" advClick="1"/>
+  <p:transition spd="med"/>
 </p:sldLayout>
 </file>
 
-<file path=ppt/slideLayouts/slideLayout9.xml><?xml version="1.0" encoding="utf-8"?>
-<p:sldLayout xmlns:a="http://schemas.openxmlformats.org/drawingml/2006/main" xmlns:r="http://schemas.openxmlformats.org/officeDocument/2006/relationships" xmlns:p="http://schemas.openxmlformats.org/presentationml/2006/main" type="tx" showMasterSp="1" showMasterPhAnim="1">
+<file path=ppt/slideLayouts/slideLayout8.xml><?xml version="1.0" encoding="utf-8"?>
+<p:sldLayout xmlns:a="http://schemas.openxmlformats.org/drawingml/2006/main" xmlns:r="http://schemas.openxmlformats.org/officeDocument/2006/relationships" xmlns:p="http://schemas.openxmlformats.org/presentationml/2006/main" type="tx">
   <p:cSld name="Photo - 3 Up">
     <p:spTree>
       <p:nvGrpSpPr>
@@ -1989,7 +1754,9 @@
       <p:sp>
         <p:nvSpPr>
           <p:cNvPr id="82" name="Image"/>
-          <p:cNvSpPr/>
+          <p:cNvSpPr>
+            <a:spLocks noGrp="1"/>
+          </p:cNvSpPr>
           <p:nvPr>
             <p:ph type="pic" sz="quarter" idx="13"/>
           </p:nvPr>
@@ -2012,14 +1779,16 @@
           </a:bodyPr>
           <a:lstStyle/>
           <a:p>
-            <a:pPr/>
+            <a:endParaRPr/>
           </a:p>
         </p:txBody>
       </p:sp>
       <p:sp>
         <p:nvSpPr>
           <p:cNvPr id="83" name="Image"/>
-          <p:cNvSpPr/>
+          <p:cNvSpPr>
+            <a:spLocks noGrp="1"/>
+          </p:cNvSpPr>
           <p:nvPr>
             <p:ph type="pic" sz="quarter" idx="14"/>
           </p:nvPr>
@@ -2042,14 +1811,16 @@
           </a:bodyPr>
           <a:lstStyle/>
           <a:p>
-            <a:pPr/>
+            <a:endParaRPr/>
           </a:p>
         </p:txBody>
       </p:sp>
       <p:sp>
         <p:nvSpPr>
           <p:cNvPr id="84" name="Image"/>
-          <p:cNvSpPr/>
+          <p:cNvSpPr>
+            <a:spLocks noGrp="1"/>
+          </p:cNvSpPr>
           <p:nvPr>
             <p:ph type="pic" sz="half" idx="15"/>
           </p:nvPr>
@@ -2072,14 +1843,16 @@
           </a:bodyPr>
           <a:lstStyle/>
           <a:p>
-            <a:pPr/>
+            <a:endParaRPr/>
           </a:p>
         </p:txBody>
       </p:sp>
       <p:sp>
         <p:nvSpPr>
           <p:cNvPr id="85" name="Slide Number"/>
-          <p:cNvSpPr/>
+          <p:cNvSpPr>
+            <a:spLocks noGrp="1"/>
+          </p:cNvSpPr>
           <p:nvPr>
             <p:ph type="sldNum" sz="quarter" idx="2"/>
           </p:nvPr>
@@ -2102,7 +1875,10 @@
                 <a:effectLst/>
               </a:defRPr>
             </a:pPr>
-            <a:fld id="{86CB4B4D-7CA3-9044-876B-883B54F8677D}" type="slidenum"/>
+            <a:fld id="{86CB4B4D-7CA3-9044-876B-883B54F8677D}" type="slidenum">
+              <a:t>‹#›</a:t>
+            </a:fld>
+            <a:endParaRPr/>
           </a:p>
         </p:txBody>
       </p:sp>
@@ -2111,7 +1887,167 @@
   <p:clrMapOvr>
     <a:masterClrMapping/>
   </p:clrMapOvr>
-  <p:transition xmlns:p14="http://schemas.microsoft.com/office/powerpoint/2010/main" spd="med" advClick="1"/>
+  <p:transition spd="med"/>
+</p:sldLayout>
+</file>
+
+<file path=ppt/slideLayouts/slideLayout9.xml><?xml version="1.0" encoding="utf-8"?>
+<p:sldLayout xmlns:a="http://schemas.openxmlformats.org/drawingml/2006/main" xmlns:r="http://schemas.openxmlformats.org/officeDocument/2006/relationships" xmlns:p="http://schemas.openxmlformats.org/presentationml/2006/main" type="tx">
+  <p:cSld name="Quote">
+    <p:spTree>
+      <p:nvGrpSpPr>
+        <p:cNvPr id="1" name=""/>
+        <p:cNvGrpSpPr/>
+        <p:nvPr/>
+      </p:nvGrpSpPr>
+      <p:grpSpPr>
+        <a:xfrm>
+          <a:off x="0" y="0"/>
+          <a:ext cx="0" cy="0"/>
+          <a:chOff x="0" y="0"/>
+          <a:chExt cx="0" cy="0"/>
+        </a:xfrm>
+      </p:grpSpPr>
+      <p:sp>
+        <p:nvSpPr>
+          <p:cNvPr id="92" name="–Johnny Appleseed"/>
+          <p:cNvSpPr>
+            <a:spLocks noGrp="1"/>
+          </p:cNvSpPr>
+          <p:nvPr>
+            <p:ph type="body" sz="quarter" idx="13"/>
+          </p:nvPr>
+        </p:nvSpPr>
+        <p:spPr>
+          <a:xfrm>
+            <a:off x="1270000" y="6362700"/>
+            <a:ext cx="10464800" cy="461366"/>
+          </a:xfrm>
+          <a:prstGeom prst="rect">
+            <a:avLst/>
+          </a:prstGeom>
+        </p:spPr>
+        <p:txBody>
+          <a:bodyPr anchor="t">
+            <a:spAutoFit/>
+          </a:bodyPr>
+          <a:lstStyle>
+            <a:lvl1pPr marL="0" indent="0" algn="ctr">
+              <a:spcBef>
+                <a:spcPts val="0"/>
+              </a:spcBef>
+              <a:buSzTx/>
+              <a:buNone/>
+              <a:defRPr sz="2400" i="1">
+                <a:solidFill>
+                  <a:srgbClr val="73BFFF"/>
+                </a:solidFill>
+                <a:effectLst>
+                  <a:outerShdw blurRad="38100" dist="36285" dir="2700000" rotWithShape="0">
+                    <a:srgbClr val="000000">
+                      <a:alpha val="48000"/>
+                    </a:srgbClr>
+                  </a:outerShdw>
+                </a:effectLst>
+                <a:latin typeface="Helvetica Neue"/>
+                <a:ea typeface="Helvetica Neue"/>
+                <a:cs typeface="Helvetica Neue"/>
+                <a:sym typeface="Helvetica Neue"/>
+              </a:defRPr>
+            </a:lvl1pPr>
+          </a:lstStyle>
+          <a:p>
+            <a:r>
+              <a:t>–Johnny Appleseed</a:t>
+            </a:r>
+          </a:p>
+        </p:txBody>
+      </p:sp>
+      <p:sp>
+        <p:nvSpPr>
+          <p:cNvPr id="93" name="“Type a quote here.”"/>
+          <p:cNvSpPr>
+            <a:spLocks noGrp="1"/>
+          </p:cNvSpPr>
+          <p:nvPr>
+            <p:ph type="body" sz="quarter" idx="14"/>
+          </p:nvPr>
+        </p:nvSpPr>
+        <p:spPr>
+          <a:xfrm>
+            <a:off x="1270000" y="4267200"/>
+            <a:ext cx="10464800" cy="647700"/>
+          </a:xfrm>
+          <a:prstGeom prst="rect">
+            <a:avLst/>
+          </a:prstGeom>
+        </p:spPr>
+        <p:txBody>
+          <a:bodyPr>
+            <a:spAutoFit/>
+          </a:bodyPr>
+          <a:lstStyle>
+            <a:lvl1pPr marL="0" indent="0" algn="ctr">
+              <a:spcBef>
+                <a:spcPts val="0"/>
+              </a:spcBef>
+              <a:buSzTx/>
+              <a:buNone/>
+              <a:defRPr>
+                <a:effectLst>
+                  <a:outerShdw blurRad="38100" dist="54428" dir="2700000" rotWithShape="0">
+                    <a:srgbClr val="000000">
+                      <a:alpha val="48000"/>
+                    </a:srgbClr>
+                  </a:outerShdw>
+                </a:effectLst>
+              </a:defRPr>
+            </a:lvl1pPr>
+          </a:lstStyle>
+          <a:p>
+            <a:r>
+              <a:t>“Type a quote here.” </a:t>
+            </a:r>
+          </a:p>
+        </p:txBody>
+      </p:sp>
+      <p:sp>
+        <p:nvSpPr>
+          <p:cNvPr id="94" name="Slide Number"/>
+          <p:cNvSpPr>
+            <a:spLocks noGrp="1"/>
+          </p:cNvSpPr>
+          <p:nvPr>
+            <p:ph type="sldNum" sz="quarter" idx="2"/>
+          </p:nvPr>
+        </p:nvSpPr>
+        <p:spPr>
+          <a:prstGeom prst="rect">
+            <a:avLst/>
+          </a:prstGeom>
+        </p:spPr>
+        <p:txBody>
+          <a:bodyPr/>
+          <a:lstStyle/>
+          <a:p>
+            <a:pPr>
+              <a:defRPr>
+                <a:effectLst/>
+              </a:defRPr>
+            </a:pPr>
+            <a:fld id="{86CB4B4D-7CA3-9044-876B-883B54F8677D}" type="slidenum">
+              <a:t>‹#›</a:t>
+            </a:fld>
+            <a:endParaRPr/>
+          </a:p>
+        </p:txBody>
+      </p:sp>
+    </p:spTree>
+  </p:cSld>
+  <p:clrMapOvr>
+    <a:masterClrMapping/>
+  </p:clrMapOvr>
+  <p:transition spd="med"/>
 </p:sldLayout>
 </file>
 
@@ -2121,12 +2057,13 @@
     <p:bg>
       <p:bgPr>
         <a:blipFill rotWithShape="1">
-          <a:blip r:embed="rId2"/>
-          <a:srcRect l="0" t="0" r="0" b="0"/>
+          <a:blip r:embed="rId13"/>
+          <a:srcRect/>
           <a:stretch>
             <a:fillRect/>
           </a:stretch>
         </a:blipFill>
+        <a:effectLst/>
       </p:bgPr>
     </p:bg>
     <p:spTree>
@@ -2146,7 +2083,9 @@
       <p:sp>
         <p:nvSpPr>
           <p:cNvPr id="2" name="Body Level One…"/>
-          <p:cNvSpPr/>
+          <p:cNvSpPr>
+            <a:spLocks noGrp="1"/>
+          </p:cNvSpPr>
           <p:nvPr>
             <p:ph type="body" idx="1"/>
           </p:nvPr>
@@ -2164,43 +2103,42 @@
           </a:ln>
           <a:extLst>
             <a:ext uri="{C572A759-6A51-4108-AA02-DFA0A04FC94B}">
-              <ma14:wrappingTextBoxFlag xmlns:ma14="http://schemas.microsoft.com/office/mac/drawingml/2011/main" val="1"/>
+              <ma14:wrappingTextBoxFlag xmlns:ma14="http://schemas.microsoft.com/office/mac/drawingml/2011/main" xmlns="" val="1"/>
             </a:ext>
           </a:extLst>
         </p:spPr>
         <p:txBody>
           <a:bodyPr lIns="50800" tIns="50800" rIns="50800" bIns="50800" anchor="ctr">
-            <a:normAutofit fontScale="100000" lnSpcReduction="0"/>
+            <a:normAutofit/>
           </a:bodyPr>
           <a:lstStyle>
             <a:lvl1pPr>
               <a:buBlip>
-                <a:blip r:embed="rId3"/>
+                <a:blip r:embed="rId14"/>
               </a:buBlip>
             </a:lvl1pPr>
             <a:lvl2pPr>
               <a:buBlip>
-                <a:blip r:embed="rId3"/>
+                <a:blip r:embed="rId14"/>
               </a:buBlip>
             </a:lvl2pPr>
             <a:lvl3pPr>
               <a:buBlip>
-                <a:blip r:embed="rId3"/>
+                <a:blip r:embed="rId14"/>
               </a:buBlip>
             </a:lvl3pPr>
             <a:lvl4pPr>
               <a:buBlip>
-                <a:blip r:embed="rId3"/>
+                <a:blip r:embed="rId14"/>
               </a:buBlip>
             </a:lvl4pPr>
             <a:lvl5pPr>
               <a:buBlip>
-                <a:blip r:embed="rId3"/>
+                <a:blip r:embed="rId14"/>
               </a:buBlip>
             </a:lvl5pPr>
           </a:lstStyle>
           <a:p>
-            <a:pPr/>
             <a:r>
               <a:t>Body Level One</a:t>
             </a:r>
@@ -2234,7 +2172,9 @@
       <p:sp>
         <p:nvSpPr>
           <p:cNvPr id="3" name="Title Text"/>
-          <p:cNvSpPr/>
+          <p:cNvSpPr>
+            <a:spLocks noGrp="1"/>
+          </p:cNvSpPr>
           <p:nvPr>
             <p:ph type="title"/>
           </p:nvPr>
@@ -2252,17 +2192,16 @@
           </a:ln>
           <a:extLst>
             <a:ext uri="{C572A759-6A51-4108-AA02-DFA0A04FC94B}">
-              <ma14:wrappingTextBoxFlag xmlns:ma14="http://schemas.microsoft.com/office/mac/drawingml/2011/main" val="1"/>
+              <ma14:wrappingTextBoxFlag xmlns:ma14="http://schemas.microsoft.com/office/mac/drawingml/2011/main" xmlns="" val="1"/>
             </a:ext>
           </a:extLst>
         </p:spPr>
         <p:txBody>
           <a:bodyPr lIns="50800" tIns="50800" rIns="50800" bIns="50800" anchor="ctr">
-            <a:normAutofit fontScale="100000" lnSpcReduction="0"/>
+            <a:normAutofit/>
           </a:bodyPr>
           <a:lstStyle/>
           <a:p>
-            <a:pPr/>
             <a:r>
               <a:t>Title Text</a:t>
             </a:r>
@@ -2272,7 +2211,9 @@
       <p:sp>
         <p:nvSpPr>
           <p:cNvPr id="4" name="Slide Number"/>
-          <p:cNvSpPr/>
+          <p:cNvSpPr>
+            <a:spLocks noGrp="1"/>
+          </p:cNvSpPr>
           <p:nvPr>
             <p:ph type="sldNum" sz="quarter" idx="2"/>
           </p:nvPr>
@@ -2295,7 +2236,7 @@
           </a:bodyPr>
           <a:lstStyle>
             <a:lvl1pPr algn="r">
-              <a:defRPr b="1" sz="1400">
+              <a:defRPr sz="1400" b="1">
                 <a:solidFill>
                   <a:srgbClr val="FFFFFF">
                     <a:alpha val="70000"/>
@@ -2314,7 +2255,10 @@
                 <a:effectLst/>
               </a:defRPr>
             </a:pPr>
-            <a:fld id="{86CB4B4D-7CA3-9044-876B-883B54F8677D}" type="slidenum"/>
+            <a:fld id="{86CB4B4D-7CA3-9044-876B-883B54F8677D}" type="slidenum">
+              <a:t>‹#›</a:t>
+            </a:fld>
+            <a:endParaRPr/>
           </a:p>
         </p:txBody>
       </p:sp>
@@ -2322,20 +2266,19 @@
   </p:cSld>
   <p:clrMap bg1="dk1" tx1="lt1" bg2="dk2" tx2="lt2" accent1="accent1" accent2="accent2" accent3="accent3" accent4="accent4" accent5="accent5" accent6="accent6" hlink="hlink" folHlink="folHlink"/>
   <p:sldLayoutIdLst>
-    <p:sldLayoutId id="2147483649" r:id="rId4"/>
-    <p:sldLayoutId id="2147483650" r:id="rId5"/>
-    <p:sldLayoutId id="2147483651" r:id="rId6"/>
-    <p:sldLayoutId id="2147483652" r:id="rId7"/>
-    <p:sldLayoutId id="2147483653" r:id="rId8"/>
-    <p:sldLayoutId id="2147483654" r:id="rId9"/>
-    <p:sldLayoutId id="2147483655" r:id="rId10"/>
-    <p:sldLayoutId id="2147483656" r:id="rId11"/>
-    <p:sldLayoutId id="2147483657" r:id="rId12"/>
-    <p:sldLayoutId id="2147483658" r:id="rId13"/>
-    <p:sldLayoutId id="2147483659" r:id="rId14"/>
-    <p:sldLayoutId id="2147483660" r:id="rId15"/>
+    <p:sldLayoutId id="2147483649" r:id="rId1"/>
+    <p:sldLayoutId id="2147483650" r:id="rId2"/>
+    <p:sldLayoutId id="2147483651" r:id="rId3"/>
+    <p:sldLayoutId id="2147483652" r:id="rId4"/>
+    <p:sldLayoutId id="2147483653" r:id="rId5"/>
+    <p:sldLayoutId id="2147483655" r:id="rId6"/>
+    <p:sldLayoutId id="2147483656" r:id="rId7"/>
+    <p:sldLayoutId id="2147483657" r:id="rId8"/>
+    <p:sldLayoutId id="2147483658" r:id="rId9"/>
+    <p:sldLayoutId id="2147483659" r:id="rId10"/>
+    <p:sldLayoutId id="2147483660" r:id="rId11"/>
   </p:sldLayoutIdLst>
-  <p:transition xmlns:p14="http://schemas.microsoft.com/office/powerpoint/2010/main" spd="med" advClick="1"/>
+  <p:transition spd="med"/>
   <p:txStyles>
     <p:titleStyle>
       <a:lvl1pPr marL="0" marR="0" indent="0" algn="l" defTabSz="584200" rtl="0" latinLnBrk="0">
@@ -2353,7 +2296,7 @@
         <a:buFontTx/>
         <a:buNone/>
         <a:tabLst/>
-        <a:defRPr b="0" baseline="0" cap="none" i="0" spc="0" strike="noStrike" sz="7200" u="none">
+        <a:defRPr sz="7200" b="0" i="0" u="none" strike="noStrike" cap="none" spc="0" baseline="0">
           <a:ln>
             <a:noFill/>
           </a:ln>
@@ -2361,7 +2304,7 @@
             <a:srgbClr val="FFFFFF"/>
           </a:solidFill>
           <a:effectLst>
-            <a:outerShdw sx="100000" sy="100000" kx="0" ky="0" algn="b" rotWithShape="0" blurRad="50800" dist="38100" dir="5400000">
+            <a:outerShdw blurRad="50800" dist="38100" dir="5400000" rotWithShape="0">
               <a:srgbClr val="000000"/>
             </a:outerShdw>
           </a:effectLst>
@@ -2387,7 +2330,7 @@
         <a:buFontTx/>
         <a:buNone/>
         <a:tabLst/>
-        <a:defRPr b="0" baseline="0" cap="none" i="0" spc="0" strike="noStrike" sz="7200" u="none">
+        <a:defRPr sz="7200" b="0" i="0" u="none" strike="noStrike" cap="none" spc="0" baseline="0">
           <a:ln>
             <a:noFill/>
           </a:ln>
@@ -2395,7 +2338,7 @@
             <a:srgbClr val="FFFFFF"/>
           </a:solidFill>
           <a:effectLst>
-            <a:outerShdw sx="100000" sy="100000" kx="0" ky="0" algn="b" rotWithShape="0" blurRad="50800" dist="38100" dir="5400000">
+            <a:outerShdw blurRad="50800" dist="38100" dir="5400000" rotWithShape="0">
               <a:srgbClr val="000000"/>
             </a:outerShdw>
           </a:effectLst>
@@ -2421,7 +2364,7 @@
         <a:buFontTx/>
         <a:buNone/>
         <a:tabLst/>
-        <a:defRPr b="0" baseline="0" cap="none" i="0" spc="0" strike="noStrike" sz="7200" u="none">
+        <a:defRPr sz="7200" b="0" i="0" u="none" strike="noStrike" cap="none" spc="0" baseline="0">
           <a:ln>
             <a:noFill/>
           </a:ln>
@@ -2429,7 +2372,7 @@
             <a:srgbClr val="FFFFFF"/>
           </a:solidFill>
           <a:effectLst>
-            <a:outerShdw sx="100000" sy="100000" kx="0" ky="0" algn="b" rotWithShape="0" blurRad="50800" dist="38100" dir="5400000">
+            <a:outerShdw blurRad="50800" dist="38100" dir="5400000" rotWithShape="0">
               <a:srgbClr val="000000"/>
             </a:outerShdw>
           </a:effectLst>
@@ -2455,7 +2398,7 @@
         <a:buFontTx/>
         <a:buNone/>
         <a:tabLst/>
-        <a:defRPr b="0" baseline="0" cap="none" i="0" spc="0" strike="noStrike" sz="7200" u="none">
+        <a:defRPr sz="7200" b="0" i="0" u="none" strike="noStrike" cap="none" spc="0" baseline="0">
           <a:ln>
             <a:noFill/>
           </a:ln>
@@ -2463,7 +2406,7 @@
             <a:srgbClr val="FFFFFF"/>
           </a:solidFill>
           <a:effectLst>
-            <a:outerShdw sx="100000" sy="100000" kx="0" ky="0" algn="b" rotWithShape="0" blurRad="50800" dist="38100" dir="5400000">
+            <a:outerShdw blurRad="50800" dist="38100" dir="5400000" rotWithShape="0">
               <a:srgbClr val="000000"/>
             </a:outerShdw>
           </a:effectLst>
@@ -2489,7 +2432,7 @@
         <a:buFontTx/>
         <a:buNone/>
         <a:tabLst/>
-        <a:defRPr b="0" baseline="0" cap="none" i="0" spc="0" strike="noStrike" sz="7200" u="none">
+        <a:defRPr sz="7200" b="0" i="0" u="none" strike="noStrike" cap="none" spc="0" baseline="0">
           <a:ln>
             <a:noFill/>
           </a:ln>
@@ -2497,7 +2440,7 @@
             <a:srgbClr val="FFFFFF"/>
           </a:solidFill>
           <a:effectLst>
-            <a:outerShdw sx="100000" sy="100000" kx="0" ky="0" algn="b" rotWithShape="0" blurRad="50800" dist="38100" dir="5400000">
+            <a:outerShdw blurRad="50800" dist="38100" dir="5400000" rotWithShape="0">
               <a:srgbClr val="000000"/>
             </a:outerShdw>
           </a:effectLst>
@@ -2523,7 +2466,7 @@
         <a:buFontTx/>
         <a:buNone/>
         <a:tabLst/>
-        <a:defRPr b="0" baseline="0" cap="none" i="0" spc="0" strike="noStrike" sz="7200" u="none">
+        <a:defRPr sz="7200" b="0" i="0" u="none" strike="noStrike" cap="none" spc="0" baseline="0">
           <a:ln>
             <a:noFill/>
           </a:ln>
@@ -2531,7 +2474,7 @@
             <a:srgbClr val="FFFFFF"/>
           </a:solidFill>
           <a:effectLst>
-            <a:outerShdw sx="100000" sy="100000" kx="0" ky="0" algn="b" rotWithShape="0" blurRad="50800" dist="38100" dir="5400000">
+            <a:outerShdw blurRad="50800" dist="38100" dir="5400000" rotWithShape="0">
               <a:srgbClr val="000000"/>
             </a:outerShdw>
           </a:effectLst>
@@ -2557,7 +2500,7 @@
         <a:buFontTx/>
         <a:buNone/>
         <a:tabLst/>
-        <a:defRPr b="0" baseline="0" cap="none" i="0" spc="0" strike="noStrike" sz="7200" u="none">
+        <a:defRPr sz="7200" b="0" i="0" u="none" strike="noStrike" cap="none" spc="0" baseline="0">
           <a:ln>
             <a:noFill/>
           </a:ln>
@@ -2565,7 +2508,7 @@
             <a:srgbClr val="FFFFFF"/>
           </a:solidFill>
           <a:effectLst>
-            <a:outerShdw sx="100000" sy="100000" kx="0" ky="0" algn="b" rotWithShape="0" blurRad="50800" dist="38100" dir="5400000">
+            <a:outerShdw blurRad="50800" dist="38100" dir="5400000" rotWithShape="0">
               <a:srgbClr val="000000"/>
             </a:outerShdw>
           </a:effectLst>
@@ -2591,7 +2534,7 @@
         <a:buFontTx/>
         <a:buNone/>
         <a:tabLst/>
-        <a:defRPr b="0" baseline="0" cap="none" i="0" spc="0" strike="noStrike" sz="7200" u="none">
+        <a:defRPr sz="7200" b="0" i="0" u="none" strike="noStrike" cap="none" spc="0" baseline="0">
           <a:ln>
             <a:noFill/>
           </a:ln>
@@ -2599,7 +2542,7 @@
             <a:srgbClr val="FFFFFF"/>
           </a:solidFill>
           <a:effectLst>
-            <a:outerShdw sx="100000" sy="100000" kx="0" ky="0" algn="b" rotWithShape="0" blurRad="50800" dist="38100" dir="5400000">
+            <a:outerShdw blurRad="50800" dist="38100" dir="5400000" rotWithShape="0">
               <a:srgbClr val="000000"/>
             </a:outerShdw>
           </a:effectLst>
@@ -2625,7 +2568,7 @@
         <a:buFontTx/>
         <a:buNone/>
         <a:tabLst/>
-        <a:defRPr b="0" baseline="0" cap="none" i="0" spc="0" strike="noStrike" sz="7200" u="none">
+        <a:defRPr sz="7200" b="0" i="0" u="none" strike="noStrike" cap="none" spc="0" baseline="0">
           <a:ln>
             <a:noFill/>
           </a:ln>
@@ -2633,7 +2576,7 @@
             <a:srgbClr val="FFFFFF"/>
           </a:solidFill>
           <a:effectLst>
-            <a:outerShdw sx="100000" sy="100000" kx="0" ky="0" algn="b" rotWithShape="0" blurRad="50800" dist="38100" dir="5400000">
+            <a:outerShdw blurRad="50800" dist="38100" dir="5400000" rotWithShape="0">
               <a:srgbClr val="000000"/>
             </a:outerShdw>
           </a:effectLst>
@@ -2660,10 +2603,10 @@
         <a:buSzPct val="30000"/>
         <a:buFontTx/>
         <a:buBlip>
-          <a:blip r:embed="rId3"/>
+          <a:blip r:embed="rId14"/>
         </a:buBlip>
         <a:tabLst/>
-        <a:defRPr b="0" baseline="0" cap="none" i="0" spc="0" strike="noStrike" sz="3600" u="none">
+        <a:defRPr sz="3600" b="0" i="0" u="none" strike="noStrike" cap="none" spc="0" baseline="0">
           <a:ln>
             <a:noFill/>
           </a:ln>
@@ -2671,7 +2614,7 @@
             <a:srgbClr val="FFFFFF"/>
           </a:solidFill>
           <a:effectLst>
-            <a:outerShdw sx="100000" sy="100000" kx="0" ky="0" algn="b" rotWithShape="0" blurRad="50800" dist="38100" dir="5400000">
+            <a:outerShdw blurRad="50800" dist="38100" dir="5400000" rotWithShape="0">
               <a:srgbClr val="000000"/>
             </a:outerShdw>
           </a:effectLst>
@@ -2696,10 +2639,10 @@
         <a:buSzPct val="30000"/>
         <a:buFontTx/>
         <a:buBlip>
-          <a:blip r:embed="rId3"/>
+          <a:blip r:embed="rId14"/>
         </a:buBlip>
         <a:tabLst/>
-        <a:defRPr b="0" baseline="0" cap="none" i="0" spc="0" strike="noStrike" sz="3600" u="none">
+        <a:defRPr sz="3600" b="0" i="0" u="none" strike="noStrike" cap="none" spc="0" baseline="0">
           <a:ln>
             <a:noFill/>
           </a:ln>
@@ -2707,7 +2650,7 @@
             <a:srgbClr val="FFFFFF"/>
           </a:solidFill>
           <a:effectLst>
-            <a:outerShdw sx="100000" sy="100000" kx="0" ky="0" algn="b" rotWithShape="0" blurRad="50800" dist="38100" dir="5400000">
+            <a:outerShdw blurRad="50800" dist="38100" dir="5400000" rotWithShape="0">
               <a:srgbClr val="000000"/>
             </a:outerShdw>
           </a:effectLst>
@@ -2732,10 +2675,10 @@
         <a:buSzPct val="30000"/>
         <a:buFontTx/>
         <a:buBlip>
-          <a:blip r:embed="rId3"/>
+          <a:blip r:embed="rId14"/>
         </a:buBlip>
         <a:tabLst/>
-        <a:defRPr b="0" baseline="0" cap="none" i="0" spc="0" strike="noStrike" sz="3600" u="none">
+        <a:defRPr sz="3600" b="0" i="0" u="none" strike="noStrike" cap="none" spc="0" baseline="0">
           <a:ln>
             <a:noFill/>
           </a:ln>
@@ -2743,7 +2686,7 @@
             <a:srgbClr val="FFFFFF"/>
           </a:solidFill>
           <a:effectLst>
-            <a:outerShdw sx="100000" sy="100000" kx="0" ky="0" algn="b" rotWithShape="0" blurRad="50800" dist="38100" dir="5400000">
+            <a:outerShdw blurRad="50800" dist="38100" dir="5400000" rotWithShape="0">
               <a:srgbClr val="000000"/>
             </a:outerShdw>
           </a:effectLst>
@@ -2768,10 +2711,10 @@
         <a:buSzPct val="30000"/>
         <a:buFontTx/>
         <a:buBlip>
-          <a:blip r:embed="rId3"/>
+          <a:blip r:embed="rId14"/>
         </a:buBlip>
         <a:tabLst/>
-        <a:defRPr b="0" baseline="0" cap="none" i="0" spc="0" strike="noStrike" sz="3600" u="none">
+        <a:defRPr sz="3600" b="0" i="0" u="none" strike="noStrike" cap="none" spc="0" baseline="0">
           <a:ln>
             <a:noFill/>
           </a:ln>
@@ -2779,7 +2722,7 @@
             <a:srgbClr val="FFFFFF"/>
           </a:solidFill>
           <a:effectLst>
-            <a:outerShdw sx="100000" sy="100000" kx="0" ky="0" algn="b" rotWithShape="0" blurRad="50800" dist="38100" dir="5400000">
+            <a:outerShdw blurRad="50800" dist="38100" dir="5400000" rotWithShape="0">
               <a:srgbClr val="000000"/>
             </a:outerShdw>
           </a:effectLst>
@@ -2804,10 +2747,10 @@
         <a:buSzPct val="30000"/>
         <a:buFontTx/>
         <a:buBlip>
-          <a:blip r:embed="rId3"/>
+          <a:blip r:embed="rId14"/>
         </a:buBlip>
         <a:tabLst/>
-        <a:defRPr b="0" baseline="0" cap="none" i="0" spc="0" strike="noStrike" sz="3600" u="none">
+        <a:defRPr sz="3600" b="0" i="0" u="none" strike="noStrike" cap="none" spc="0" baseline="0">
           <a:ln>
             <a:noFill/>
           </a:ln>
@@ -2815,7 +2758,7 @@
             <a:srgbClr val="FFFFFF"/>
           </a:solidFill>
           <a:effectLst>
-            <a:outerShdw sx="100000" sy="100000" kx="0" ky="0" algn="b" rotWithShape="0" blurRad="50800" dist="38100" dir="5400000">
+            <a:outerShdw blurRad="50800" dist="38100" dir="5400000" rotWithShape="0">
               <a:srgbClr val="000000"/>
             </a:outerShdw>
           </a:effectLst>
@@ -2840,10 +2783,10 @@
         <a:buSzPct val="30000"/>
         <a:buFontTx/>
         <a:buBlip>
-          <a:blip r:embed="rId3"/>
+          <a:blip r:embed="rId14"/>
         </a:buBlip>
         <a:tabLst/>
-        <a:defRPr b="0" baseline="0" cap="none" i="0" spc="0" strike="noStrike" sz="3600" u="none">
+        <a:defRPr sz="3600" b="0" i="0" u="none" strike="noStrike" cap="none" spc="0" baseline="0">
           <a:ln>
             <a:noFill/>
           </a:ln>
@@ -2851,7 +2794,7 @@
             <a:srgbClr val="FFFFFF"/>
           </a:solidFill>
           <a:effectLst>
-            <a:outerShdw sx="100000" sy="100000" kx="0" ky="0" algn="b" rotWithShape="0" blurRad="50800" dist="38100" dir="5400000">
+            <a:outerShdw blurRad="50800" dist="38100" dir="5400000" rotWithShape="0">
               <a:srgbClr val="000000"/>
             </a:outerShdw>
           </a:effectLst>
@@ -2876,10 +2819,10 @@
         <a:buSzPct val="30000"/>
         <a:buFontTx/>
         <a:buBlip>
-          <a:blip r:embed="rId3"/>
+          <a:blip r:embed="rId14"/>
         </a:buBlip>
         <a:tabLst/>
-        <a:defRPr b="0" baseline="0" cap="none" i="0" spc="0" strike="noStrike" sz="3600" u="none">
+        <a:defRPr sz="3600" b="0" i="0" u="none" strike="noStrike" cap="none" spc="0" baseline="0">
           <a:ln>
             <a:noFill/>
           </a:ln>
@@ -2887,7 +2830,7 @@
             <a:srgbClr val="FFFFFF"/>
           </a:solidFill>
           <a:effectLst>
-            <a:outerShdw sx="100000" sy="100000" kx="0" ky="0" algn="b" rotWithShape="0" blurRad="50800" dist="38100" dir="5400000">
+            <a:outerShdw blurRad="50800" dist="38100" dir="5400000" rotWithShape="0">
               <a:srgbClr val="000000"/>
             </a:outerShdw>
           </a:effectLst>
@@ -2912,10 +2855,10 @@
         <a:buSzPct val="30000"/>
         <a:buFontTx/>
         <a:buBlip>
-          <a:blip r:embed="rId3"/>
+          <a:blip r:embed="rId14"/>
         </a:buBlip>
         <a:tabLst/>
-        <a:defRPr b="0" baseline="0" cap="none" i="0" spc="0" strike="noStrike" sz="3600" u="none">
+        <a:defRPr sz="3600" b="0" i="0" u="none" strike="noStrike" cap="none" spc="0" baseline="0">
           <a:ln>
             <a:noFill/>
           </a:ln>
@@ -2923,7 +2866,7 @@
             <a:srgbClr val="FFFFFF"/>
           </a:solidFill>
           <a:effectLst>
-            <a:outerShdw sx="100000" sy="100000" kx="0" ky="0" algn="b" rotWithShape="0" blurRad="50800" dist="38100" dir="5400000">
+            <a:outerShdw blurRad="50800" dist="38100" dir="5400000" rotWithShape="0">
               <a:srgbClr val="000000"/>
             </a:outerShdw>
           </a:effectLst>
@@ -2948,10 +2891,10 @@
         <a:buSzPct val="30000"/>
         <a:buFontTx/>
         <a:buBlip>
-          <a:blip r:embed="rId3"/>
+          <a:blip r:embed="rId14"/>
         </a:buBlip>
         <a:tabLst/>
-        <a:defRPr b="0" baseline="0" cap="none" i="0" spc="0" strike="noStrike" sz="3600" u="none">
+        <a:defRPr sz="3600" b="0" i="0" u="none" strike="noStrike" cap="none" spc="0" baseline="0">
           <a:ln>
             <a:noFill/>
           </a:ln>
@@ -2959,7 +2902,7 @@
             <a:srgbClr val="FFFFFF"/>
           </a:solidFill>
           <a:effectLst>
-            <a:outerShdw sx="100000" sy="100000" kx="0" ky="0" algn="b" rotWithShape="0" blurRad="50800" dist="38100" dir="5400000">
+            <a:outerShdw blurRad="50800" dist="38100" dir="5400000" rotWithShape="0">
               <a:srgbClr val="000000"/>
             </a:outerShdw>
           </a:effectLst>
@@ -2987,7 +2930,7 @@
         <a:buFontTx/>
         <a:buNone/>
         <a:tabLst/>
-        <a:defRPr b="1" baseline="0" cap="none" i="0" spc="0" strike="noStrike" sz="1400" u="none">
+        <a:defRPr sz="1400" b="1" i="0" u="none" strike="noStrike" cap="none" spc="0" baseline="0">
           <a:ln>
             <a:noFill/>
           </a:ln>
@@ -3016,7 +2959,7 @@
         <a:buFontTx/>
         <a:buNone/>
         <a:tabLst/>
-        <a:defRPr b="1" baseline="0" cap="none" i="0" spc="0" strike="noStrike" sz="1400" u="none">
+        <a:defRPr sz="1400" b="1" i="0" u="none" strike="noStrike" cap="none" spc="0" baseline="0">
           <a:ln>
             <a:noFill/>
           </a:ln>
@@ -3045,7 +2988,7 @@
         <a:buFontTx/>
         <a:buNone/>
         <a:tabLst/>
-        <a:defRPr b="1" baseline="0" cap="none" i="0" spc="0" strike="noStrike" sz="1400" u="none">
+        <a:defRPr sz="1400" b="1" i="0" u="none" strike="noStrike" cap="none" spc="0" baseline="0">
           <a:ln>
             <a:noFill/>
           </a:ln>
@@ -3074,7 +3017,7 @@
         <a:buFontTx/>
         <a:buNone/>
         <a:tabLst/>
-        <a:defRPr b="1" baseline="0" cap="none" i="0" spc="0" strike="noStrike" sz="1400" u="none">
+        <a:defRPr sz="1400" b="1" i="0" u="none" strike="noStrike" cap="none" spc="0" baseline="0">
           <a:ln>
             <a:noFill/>
           </a:ln>
@@ -3103,7 +3046,7 @@
         <a:buFontTx/>
         <a:buNone/>
         <a:tabLst/>
-        <a:defRPr b="1" baseline="0" cap="none" i="0" spc="0" strike="noStrike" sz="1400" u="none">
+        <a:defRPr sz="1400" b="1" i="0" u="none" strike="noStrike" cap="none" spc="0" baseline="0">
           <a:ln>
             <a:noFill/>
           </a:ln>
@@ -3132,7 +3075,7 @@
         <a:buFontTx/>
         <a:buNone/>
         <a:tabLst/>
-        <a:defRPr b="1" baseline="0" cap="none" i="0" spc="0" strike="noStrike" sz="1400" u="none">
+        <a:defRPr sz="1400" b="1" i="0" u="none" strike="noStrike" cap="none" spc="0" baseline="0">
           <a:ln>
             <a:noFill/>
           </a:ln>
@@ -3161,7 +3104,7 @@
         <a:buFontTx/>
         <a:buNone/>
         <a:tabLst/>
-        <a:defRPr b="1" baseline="0" cap="none" i="0" spc="0" strike="noStrike" sz="1400" u="none">
+        <a:defRPr sz="1400" b="1" i="0" u="none" strike="noStrike" cap="none" spc="0" baseline="0">
           <a:ln>
             <a:noFill/>
           </a:ln>
@@ -3190,7 +3133,7 @@
         <a:buFontTx/>
         <a:buNone/>
         <a:tabLst/>
-        <a:defRPr b="1" baseline="0" cap="none" i="0" spc="0" strike="noStrike" sz="1400" u="none">
+        <a:defRPr sz="1400" b="1" i="0" u="none" strike="noStrike" cap="none" spc="0" baseline="0">
           <a:ln>
             <a:noFill/>
           </a:ln>
@@ -3219,7 +3162,7 @@
         <a:buFontTx/>
         <a:buNone/>
         <a:tabLst/>
-        <a:defRPr b="1" baseline="0" cap="none" i="0" spc="0" strike="noStrike" sz="1400" u="none">
+        <a:defRPr sz="1400" b="1" i="0" u="none" strike="noStrike" cap="none" spc="0" baseline="0">
           <a:ln>
             <a:noFill/>
           </a:ln>
@@ -3239,7 +3182,7 @@
 </file>
 
 <file path=ppt/slides/slide1.xml><?xml version="1.0" encoding="utf-8"?>
-<p:sld xmlns:a="http://schemas.openxmlformats.org/drawingml/2006/main" xmlns:r="http://schemas.openxmlformats.org/officeDocument/2006/relationships" xmlns:p="http://schemas.openxmlformats.org/presentationml/2006/main" showMasterSp="1" showMasterPhAnim="1">
+<p:sld xmlns:a="http://schemas.openxmlformats.org/drawingml/2006/main" xmlns:r="http://schemas.openxmlformats.org/officeDocument/2006/relationships" xmlns:p="http://schemas.openxmlformats.org/presentationml/2006/main">
   <p:cSld>
     <p:spTree>
       <p:nvGrpSpPr>
@@ -3258,7 +3201,9 @@
       <p:sp>
         <p:nvSpPr>
           <p:cNvPr id="118" name="Prediction of Lab Origins From Feature Analysis of The Reads Sequencing Data"/>
-          <p:cNvSpPr/>
+          <p:cNvSpPr>
+            <a:spLocks noGrp="1"/>
+          </p:cNvSpPr>
           <p:nvPr>
             <p:ph type="ctrTitle"/>
           </p:nvPr>
@@ -3274,7 +3219,7 @@
             <a:lvl1pPr defTabSz="578358">
               <a:defRPr sz="7128">
                 <a:effectLst>
-                  <a:outerShdw sx="100000" sy="100000" kx="0" ky="0" algn="b" rotWithShape="0" blurRad="50292" dist="37719" dir="5400000">
+                  <a:outerShdw blurRad="50292" dist="37719" dir="5400000" rotWithShape="0">
                     <a:srgbClr val="000000"/>
                   </a:outerShdw>
                 </a:effectLst>
@@ -3282,9 +3227,25 @@
             </a:lvl1pPr>
           </a:lstStyle>
           <a:p>
-            <a:pPr/>
-            <a:r>
-              <a:t>Prediction of Lab Origins From Feature Analysis of The Reads Sequencing Data</a:t>
+            <a:r>
+              <a:rPr dirty="0"/>
+              <a:t>Prediction of Lab Origins From Feature Analysis of</a:t>
+            </a:r>
+            <a:r>
+              <a:rPr lang="en-US" dirty="0"/>
+              <a:t> </a:t>
+            </a:r>
+            <a:r>
+              <a:rPr dirty="0"/>
+              <a:t>Sequencing </a:t>
+            </a:r>
+            <a:r>
+              <a:rPr lang="en-US" dirty="0"/>
+              <a:t>Read </a:t>
+            </a:r>
+            <a:r>
+              <a:rPr dirty="0"/>
+              <a:t>Data</a:t>
             </a:r>
           </a:p>
         </p:txBody>
@@ -3292,7 +3253,9 @@
       <p:sp>
         <p:nvSpPr>
           <p:cNvPr id="119" name="———Bowen Xue/Andy Lin/Fan Zhang"/>
-          <p:cNvSpPr/>
+          <p:cNvSpPr>
+            <a:spLocks noGrp="1"/>
+          </p:cNvSpPr>
           <p:nvPr>
             <p:ph type="subTitle" sz="quarter" idx="1"/>
           </p:nvPr>
@@ -3308,7 +3271,6 @@
             <a:lvl1pPr algn="r"/>
           </a:lstStyle>
           <a:p>
-            <a:pPr/>
             <a:r>
               <a:t>———Bowen Xue/Andy Lin/Fan Zhang</a:t>
             </a:r>
@@ -3320,12 +3282,12 @@
   <p:clrMapOvr>
     <a:masterClrMapping/>
   </p:clrMapOvr>
-  <p:transition xmlns:p14="http://schemas.microsoft.com/office/powerpoint/2010/main" spd="med" advClick="1"/>
+  <p:transition spd="med"/>
 </p:sld>
 </file>
 
 <file path=ppt/slides/slide10.xml><?xml version="1.0" encoding="utf-8"?>
-<p:sld xmlns:a="http://schemas.openxmlformats.org/drawingml/2006/main" xmlns:r="http://schemas.openxmlformats.org/officeDocument/2006/relationships" xmlns:p="http://schemas.openxmlformats.org/presentationml/2006/main" showMasterSp="1" showMasterPhAnim="1">
+<p:sld xmlns:a="http://schemas.openxmlformats.org/drawingml/2006/main" xmlns:r="http://schemas.openxmlformats.org/officeDocument/2006/relationships" xmlns:p="http://schemas.openxmlformats.org/presentationml/2006/main">
   <p:cSld>
     <p:spTree>
       <p:nvGrpSpPr>
@@ -3344,7 +3306,9 @@
       <p:sp>
         <p:nvSpPr>
           <p:cNvPr id="146" name="Project Results"/>
-          <p:cNvSpPr/>
+          <p:cNvSpPr>
+            <a:spLocks noGrp="1"/>
+          </p:cNvSpPr>
           <p:nvPr>
             <p:ph type="title"/>
           </p:nvPr>
@@ -3367,7 +3331,7 @@
                   <a:srgbClr val="FFFB00"/>
                 </a:solidFill>
                 <a:effectLst>
-                  <a:outerShdw sx="100000" sy="100000" kx="0" ky="0" algn="b" rotWithShape="0" blurRad="47752" dist="35814" dir="5400000">
+                  <a:outerShdw blurRad="47752" dist="35814" dir="5400000" rotWithShape="0">
                     <a:srgbClr val="000000"/>
                   </a:outerShdw>
                 </a:effectLst>
@@ -3375,7 +3339,6 @@
             </a:lvl1pPr>
           </a:lstStyle>
           <a:p>
-            <a:pPr/>
             <a:r>
               <a:t>Project Results</a:t>
             </a:r>
@@ -3385,7 +3348,9 @@
       <p:sp>
         <p:nvSpPr>
           <p:cNvPr id="147" name="Supervised learning…"/>
-          <p:cNvSpPr/>
+          <p:cNvSpPr>
+            <a:spLocks noGrp="1"/>
+          </p:cNvSpPr>
           <p:nvPr>
             <p:ph type="body" idx="1"/>
           </p:nvPr>
@@ -3403,7 +3368,7 @@
           <a:bodyPr anchor="t"/>
           <a:lstStyle/>
           <a:p>
-            <a:pPr lvl="4" marL="444500">
+            <a:pPr marL="444500" lvl="4">
               <a:buSzPct val="75000"/>
               <a:buChar char="•"/>
               <a:defRPr>
@@ -3417,7 +3382,7 @@
             </a:r>
           </a:p>
           <a:p>
-            <a:pPr lvl="5" marL="0" indent="1143000">
+            <a:pPr marL="0" lvl="5" indent="1143000">
               <a:buSzTx/>
               <a:buNone/>
             </a:pPr>
@@ -3426,19 +3391,21 @@
             </a:r>
           </a:p>
           <a:p>
-            <a:pPr lvl="5" marL="0" indent="1143000">
+            <a:pPr marL="0" lvl="5" indent="1143000">
               <a:buSzTx/>
               <a:buNone/>
             </a:pPr>
-          </a:p>
-          <a:p>
-            <a:pPr lvl="5" marL="0" indent="1143000">
+            <a:endParaRPr/>
+          </a:p>
+          <a:p>
+            <a:pPr marL="0" lvl="5" indent="1143000">
               <a:buSzTx/>
               <a:buNone/>
             </a:pPr>
-          </a:p>
-          <a:p>
-            <a:pPr lvl="5" marL="0" indent="1143000">
+            <a:endParaRPr/>
+          </a:p>
+          <a:p>
+            <a:pPr marL="0" lvl="5" indent="1143000">
               <a:buSzTx/>
               <a:buNone/>
             </a:pPr>
@@ -3467,7 +3434,7 @@
           </a:ln>
           <a:extLst>
             <a:ext uri="{C572A759-6A51-4108-AA02-DFA0A04FC94B}">
-              <ma14:wrappingTextBoxFlag xmlns:ma14="http://schemas.microsoft.com/office/mac/drawingml/2011/main" val="1"/>
+              <ma14:wrappingTextBoxFlag xmlns:ma14="http://schemas.microsoft.com/office/mac/drawingml/2011/main" xmlns="" val="1"/>
             </a:ext>
           </a:extLst>
         </p:spPr>
@@ -3477,7 +3444,6 @@
           </a:bodyPr>
           <a:lstStyle/>
           <a:p>
-            <a:pPr/>
             <a:r>
               <a:t>&lt;result pic&gt;</a:t>
             </a:r>
@@ -3503,7 +3469,7 @@
           </a:ln>
           <a:extLst>
             <a:ext uri="{C572A759-6A51-4108-AA02-DFA0A04FC94B}">
-              <ma14:wrappingTextBoxFlag xmlns:ma14="http://schemas.microsoft.com/office/mac/drawingml/2011/main" val="1"/>
+              <ma14:wrappingTextBoxFlag xmlns:ma14="http://schemas.microsoft.com/office/mac/drawingml/2011/main" xmlns="" val="1"/>
             </a:ext>
           </a:extLst>
         </p:spPr>
@@ -3513,7 +3479,6 @@
           </a:bodyPr>
           <a:lstStyle/>
           <a:p>
-            <a:pPr/>
             <a:r>
               <a:t>&lt;result pic&gt;</a:t>
             </a:r>
@@ -3525,12 +3490,12 @@
   <p:clrMapOvr>
     <a:masterClrMapping/>
   </p:clrMapOvr>
-  <p:transition xmlns:p14="http://schemas.microsoft.com/office/powerpoint/2010/main" spd="med" advClick="1"/>
+  <p:transition spd="med"/>
 </p:sld>
 </file>
 
 <file path=ppt/slides/slide11.xml><?xml version="1.0" encoding="utf-8"?>
-<p:sld xmlns:a="http://schemas.openxmlformats.org/drawingml/2006/main" xmlns:r="http://schemas.openxmlformats.org/officeDocument/2006/relationships" xmlns:p="http://schemas.openxmlformats.org/presentationml/2006/main" showMasterSp="1" showMasterPhAnim="1">
+<p:sld xmlns:a="http://schemas.openxmlformats.org/drawingml/2006/main" xmlns:r="http://schemas.openxmlformats.org/officeDocument/2006/relationships" xmlns:p="http://schemas.openxmlformats.org/presentationml/2006/main">
   <p:cSld>
     <p:spTree>
       <p:nvGrpSpPr>
@@ -3549,7 +3514,9 @@
       <p:sp>
         <p:nvSpPr>
           <p:cNvPr id="151" name="Project Results"/>
-          <p:cNvSpPr/>
+          <p:cNvSpPr>
+            <a:spLocks noGrp="1"/>
+          </p:cNvSpPr>
           <p:nvPr>
             <p:ph type="title"/>
           </p:nvPr>
@@ -3572,7 +3539,7 @@
                   <a:srgbClr val="FFFB00"/>
                 </a:solidFill>
                 <a:effectLst>
-                  <a:outerShdw sx="100000" sy="100000" kx="0" ky="0" algn="b" rotWithShape="0" blurRad="47752" dist="35814" dir="5400000">
+                  <a:outerShdw blurRad="47752" dist="35814" dir="5400000" rotWithShape="0">
                     <a:srgbClr val="000000"/>
                   </a:outerShdw>
                 </a:effectLst>
@@ -3580,7 +3547,6 @@
             </a:lvl1pPr>
           </a:lstStyle>
           <a:p>
-            <a:pPr/>
             <a:r>
               <a:t>Project Results</a:t>
             </a:r>
@@ -3590,7 +3556,9 @@
       <p:sp>
         <p:nvSpPr>
           <p:cNvPr id="152" name="Supervised learning…"/>
-          <p:cNvSpPr/>
+          <p:cNvSpPr>
+            <a:spLocks noGrp="1"/>
+          </p:cNvSpPr>
           <p:nvPr>
             <p:ph type="body" idx="1"/>
           </p:nvPr>
@@ -3608,7 +3576,7 @@
           <a:bodyPr anchor="t"/>
           <a:lstStyle/>
           <a:p>
-            <a:pPr lvl="4" marL="444500">
+            <a:pPr marL="444500" lvl="4">
               <a:buSzPct val="75000"/>
               <a:buChar char="•"/>
             </a:pPr>
@@ -3617,7 +3585,7 @@
             </a:r>
           </a:p>
           <a:p>
-            <a:pPr lvl="5" marL="0" indent="1143000">
+            <a:pPr marL="0" lvl="5" indent="1143000">
               <a:buSzTx/>
               <a:buNone/>
             </a:pPr>
@@ -3626,7 +3594,7 @@
             </a:r>
           </a:p>
           <a:p>
-            <a:pPr lvl="5" marL="0" indent="1143000">
+            <a:pPr marL="0" lvl="5" indent="1143000">
               <a:buSzTx/>
               <a:buNone/>
             </a:pPr>
@@ -3635,7 +3603,7 @@
             </a:r>
           </a:p>
           <a:p>
-            <a:pPr lvl="4" marL="444500">
+            <a:pPr marL="444500" lvl="4">
               <a:buSzPct val="75000"/>
               <a:buChar char="•"/>
               <a:defRPr>
@@ -3669,7 +3637,7 @@
           </a:ln>
           <a:extLst>
             <a:ext uri="{C572A759-6A51-4108-AA02-DFA0A04FC94B}">
-              <ma14:wrappingTextBoxFlag xmlns:ma14="http://schemas.microsoft.com/office/mac/drawingml/2011/main" val="1"/>
+              <ma14:wrappingTextBoxFlag xmlns:ma14="http://schemas.microsoft.com/office/mac/drawingml/2011/main" xmlns="" val="1"/>
             </a:ext>
           </a:extLst>
         </p:spPr>
@@ -3679,7 +3647,6 @@
           </a:bodyPr>
           <a:lstStyle/>
           <a:p>
-            <a:pPr/>
             <a:r>
               <a:t>&lt;result pic&gt;</a:t>
             </a:r>
@@ -3691,12 +3658,12 @@
   <p:clrMapOvr>
     <a:masterClrMapping/>
   </p:clrMapOvr>
-  <p:transition xmlns:p14="http://schemas.microsoft.com/office/powerpoint/2010/main" spd="med" advClick="1"/>
+  <p:transition spd="med"/>
 </p:sld>
 </file>
 
 <file path=ppt/slides/slide12.xml><?xml version="1.0" encoding="utf-8"?>
-<p:sld xmlns:a="http://schemas.openxmlformats.org/drawingml/2006/main" xmlns:r="http://schemas.openxmlformats.org/officeDocument/2006/relationships" xmlns:p="http://schemas.openxmlformats.org/presentationml/2006/main" showMasterSp="1" showMasterPhAnim="1">
+<p:sld xmlns:a="http://schemas.openxmlformats.org/drawingml/2006/main" xmlns:r="http://schemas.openxmlformats.org/officeDocument/2006/relationships" xmlns:p="http://schemas.openxmlformats.org/presentationml/2006/main">
   <p:cSld>
     <p:spTree>
       <p:nvGrpSpPr>
@@ -3731,7 +3698,7 @@
           </a:ln>
           <a:extLst>
             <a:ext uri="{C572A759-6A51-4108-AA02-DFA0A04FC94B}">
-              <ma14:wrappingTextBoxFlag xmlns:ma14="http://schemas.microsoft.com/office/mac/drawingml/2011/main" val="1"/>
+              <ma14:wrappingTextBoxFlag xmlns:ma14="http://schemas.microsoft.com/office/mac/drawingml/2011/main" xmlns="" val="1"/>
             </a:ext>
           </a:extLst>
         </p:spPr>
@@ -3741,7 +3708,6 @@
           </a:bodyPr>
           <a:lstStyle/>
           <a:p>
-            <a:pPr/>
             <a:r>
               <a:t>&lt;picture of the classification effect&gt;</a:t>
             </a:r>
@@ -3753,12 +3719,12 @@
   <p:clrMapOvr>
     <a:masterClrMapping/>
   </p:clrMapOvr>
-  <p:transition xmlns:p14="http://schemas.microsoft.com/office/powerpoint/2010/main" spd="med" advClick="1"/>
+  <p:transition spd="med"/>
 </p:sld>
 </file>
 
 <file path=ppt/slides/slide13.xml><?xml version="1.0" encoding="utf-8"?>
-<p:sld xmlns:a="http://schemas.openxmlformats.org/drawingml/2006/main" xmlns:r="http://schemas.openxmlformats.org/officeDocument/2006/relationships" xmlns:p="http://schemas.openxmlformats.org/presentationml/2006/main" showMasterSp="1" showMasterPhAnim="1">
+<p:sld xmlns:a="http://schemas.openxmlformats.org/drawingml/2006/main" xmlns:r="http://schemas.openxmlformats.org/officeDocument/2006/relationships" xmlns:p="http://schemas.openxmlformats.org/presentationml/2006/main">
   <p:cSld>
     <p:spTree>
       <p:nvGrpSpPr>
@@ -3778,7 +3744,7 @@
         <p:nvPicPr>
           <p:cNvPr id="157" name="social_dna-vs-rna.jpg" descr="social_dna-vs-rna.jpg"/>
           <p:cNvPicPr>
-            <a:picLocks noChangeAspect="0"/>
+            <a:picLocks noGrp="1"/>
           </p:cNvPicPr>
           <p:nvPr>
             <p:ph type="pic" idx="13"/>
@@ -3805,7 +3771,9 @@
       <p:sp>
         <p:nvSpPr>
           <p:cNvPr id="158" name="Thank you!"/>
-          <p:cNvSpPr/>
+          <p:cNvSpPr>
+            <a:spLocks noGrp="1"/>
+          </p:cNvSpPr>
           <p:nvPr>
             <p:ph type="title"/>
           </p:nvPr>
@@ -3831,7 +3799,6 @@
             </a:lvl1pPr>
           </a:lstStyle>
           <a:p>
-            <a:pPr/>
             <a:r>
               <a:t>Thank you! </a:t>
             </a:r>
@@ -3857,7 +3824,7 @@
           </a:ln>
           <a:extLst>
             <a:ext uri="{C572A759-6A51-4108-AA02-DFA0A04FC94B}">
-              <ma14:wrappingTextBoxFlag xmlns:ma14="http://schemas.microsoft.com/office/mac/drawingml/2011/main" val="1"/>
+              <ma14:wrappingTextBoxFlag xmlns:ma14="http://schemas.microsoft.com/office/mac/drawingml/2011/main" xmlns="" val="1"/>
             </a:ext>
           </a:extLst>
         </p:spPr>
@@ -3875,7 +3842,6 @@
             </a:lvl1pPr>
           </a:lstStyle>
           <a:p>
-            <a:pPr/>
             <a:r>
               <a:t>Questions?</a:t>
             </a:r>
@@ -3887,160 +3853,12 @@
   <p:clrMapOvr>
     <a:masterClrMapping/>
   </p:clrMapOvr>
-  <p:transition xmlns:p14="http://schemas.microsoft.com/office/powerpoint/2010/main" spd="med" advClick="1"/>
+  <p:transition spd="med"/>
 </p:sld>
 </file>
 
 <file path=ppt/slides/slide2.xml><?xml version="1.0" encoding="utf-8"?>
-<p:sld xmlns:a="http://schemas.openxmlformats.org/drawingml/2006/main" xmlns:r="http://schemas.openxmlformats.org/officeDocument/2006/relationships" xmlns:p="http://schemas.openxmlformats.org/presentationml/2006/main" showMasterSp="1" showMasterPhAnim="1">
-  <p:cSld>
-    <p:spTree>
-      <p:nvGrpSpPr>
-        <p:cNvPr id="1" name=""/>
-        <p:cNvGrpSpPr/>
-        <p:nvPr/>
-      </p:nvGrpSpPr>
-      <p:grpSpPr>
-        <a:xfrm>
-          <a:off x="0" y="0"/>
-          <a:ext cx="0" cy="0"/>
-          <a:chOff x="0" y="0"/>
-          <a:chExt cx="0" cy="0"/>
-        </a:xfrm>
-      </p:grpSpPr>
-      <p:sp>
-        <p:nvSpPr>
-          <p:cNvPr id="121" name="Background"/>
-          <p:cNvSpPr/>
-          <p:nvPr>
-            <p:ph type="title"/>
-          </p:nvPr>
-        </p:nvSpPr>
-        <p:spPr>
-          <a:xfrm>
-            <a:off x="1357391" y="7482189"/>
-            <a:ext cx="11430001" cy="1219201"/>
-          </a:xfrm>
-          <a:prstGeom prst="rect">
-            <a:avLst/>
-          </a:prstGeom>
-        </p:spPr>
-        <p:txBody>
-          <a:bodyPr/>
-          <a:lstStyle>
-            <a:lvl1pPr algn="r">
-              <a:defRPr>
-                <a:solidFill>
-                  <a:srgbClr val="FFFB00"/>
-                </a:solidFill>
-              </a:defRPr>
-            </a:lvl1pPr>
-          </a:lstStyle>
-          <a:p>
-            <a:pPr/>
-            <a:r>
-              <a:t>Background</a:t>
-            </a:r>
-          </a:p>
-        </p:txBody>
-      </p:sp>
-      <p:sp>
-        <p:nvSpPr>
-          <p:cNvPr id="122" name="For forensic investigation, it’s important to determine where a DNA sample was sequenced…"/>
-          <p:cNvSpPr/>
-          <p:nvPr/>
-        </p:nvSpPr>
-        <p:spPr>
-          <a:xfrm>
-            <a:off x="134801" y="1261806"/>
-            <a:ext cx="12735197" cy="4620028"/>
-          </a:xfrm>
-          <a:prstGeom prst="rect">
-            <a:avLst/>
-          </a:prstGeom>
-          <a:ln w="12700">
-            <a:miter lim="400000"/>
-          </a:ln>
-          <a:extLst>
-            <a:ext uri="{C572A759-6A51-4108-AA02-DFA0A04FC94B}">
-              <ma14:wrappingTextBoxFlag xmlns:ma14="http://schemas.microsoft.com/office/mac/drawingml/2011/main" val="1"/>
-            </a:ext>
-          </a:extLst>
-        </p:spPr>
-        <p:txBody>
-          <a:bodyPr wrap="none" lIns="50800" tIns="50800" rIns="50800" bIns="50800" anchor="ctr">
-            <a:spAutoFit/>
-          </a:bodyPr>
-          <a:lstStyle/>
-          <a:p>
-            <a:pPr marL="518583" indent="-518583" algn="l">
-              <a:buSzPct val="75000"/>
-              <a:buChar char="•"/>
-            </a:pPr>
-            <a:r>
-              <a:t>For forensic investigation, it’s important to determine where a DNA sample was sequenced </a:t>
-            </a:r>
-          </a:p>
-          <a:p>
-            <a:pPr marL="518583" indent="-518583" algn="l">
-              <a:buSzPct val="75000"/>
-              <a:buChar char="•"/>
-            </a:pPr>
-            <a:r>
-              <a:t>Datasets from different sequencing institutions have informative features which makes it possible to use machine learning to do the classification</a:t>
-            </a:r>
-          </a:p>
-          <a:p>
-            <a:pPr marL="518583" indent="-518583" algn="l">
-              <a:buSzPct val="75000"/>
-              <a:buChar char="•"/>
-            </a:pPr>
-            <a:r>
-              <a:t>We will focus on institutions that have sequenced Escherichia coli using Illumina MiSeqs</a:t>
-            </a:r>
-          </a:p>
-        </p:txBody>
-      </p:sp>
-      <p:pic>
-        <p:nvPicPr>
-          <p:cNvPr id="123" name="Scanning_electron_micrograph_of_an_E._coli_colony.jpg" descr="Scanning_electron_micrograph_of_an_E._coli_colony.jpg"/>
-          <p:cNvPicPr>
-            <a:picLocks noChangeAspect="1"/>
-          </p:cNvPicPr>
-          <p:nvPr/>
-        </p:nvPicPr>
-        <p:blipFill>
-          <a:blip r:embed="rId2">
-            <a:extLst/>
-          </a:blip>
-          <a:stretch>
-            <a:fillRect/>
-          </a:stretch>
-        </p:blipFill>
-        <p:spPr>
-          <a:xfrm>
-            <a:off x="744422" y="6106754"/>
-            <a:ext cx="4322913" cy="2933406"/>
-          </a:xfrm>
-          <a:prstGeom prst="rect">
-            <a:avLst/>
-          </a:prstGeom>
-          <a:ln w="12700">
-            <a:miter lim="400000"/>
-          </a:ln>
-        </p:spPr>
-      </p:pic>
-    </p:spTree>
-  </p:cSld>
-  <p:clrMapOvr>
-    <a:masterClrMapping/>
-  </p:clrMapOvr>
-  <p:transition xmlns:p14="http://schemas.microsoft.com/office/powerpoint/2010/main" spd="med" advClick="1"/>
-</p:sld>
-</file>
-
-<file path=ppt/slides/slide3.xml><?xml version="1.0" encoding="utf-8"?>
-<p:sld xmlns:a="http://schemas.openxmlformats.org/drawingml/2006/main" xmlns:r="http://schemas.openxmlformats.org/officeDocument/2006/relationships" xmlns:p="http://schemas.openxmlformats.org/presentationml/2006/main" showMasterSp="1" showMasterPhAnim="1">
+<p:sld xmlns:a="http://schemas.openxmlformats.org/drawingml/2006/main" xmlns:r="http://schemas.openxmlformats.org/officeDocument/2006/relationships" xmlns:p="http://schemas.openxmlformats.org/presentationml/2006/main">
   <p:cSld>
     <p:spTree>
       <p:nvGrpSpPr>
@@ -4059,7 +3877,9 @@
       <p:sp>
         <p:nvSpPr>
           <p:cNvPr id="125" name="Project Scheme"/>
-          <p:cNvSpPr/>
+          <p:cNvSpPr>
+            <a:spLocks noGrp="1"/>
+          </p:cNvSpPr>
           <p:nvPr>
             <p:ph type="title"/>
           </p:nvPr>
@@ -4083,25 +3903,26 @@
                   <a:srgbClr val="FFFB00"/>
                 </a:solidFill>
                 <a:effectLst>
-                  <a:outerShdw sx="100000" sy="100000" kx="0" ky="0" algn="b" rotWithShape="0" blurRad="47752" dist="35814" dir="5400000">
+                  <a:outerShdw blurRad="47752" dist="35814" dir="5400000" rotWithShape="0">
                     <a:srgbClr val="000000"/>
                   </a:outerShdw>
                 </a:effectLst>
               </a:defRPr>
             </a:pPr>
             <a:r>
-              <a:t>Project S</a:t>
-            </a:r>
-            <a:r>
-              <a:t>cheme</a:t>
-            </a:r>
+              <a:rPr lang="en-US" dirty="0"/>
+              <a:t>Background</a:t>
+            </a:r>
+            <a:endParaRPr dirty="0"/>
           </a:p>
         </p:txBody>
       </p:sp>
       <p:sp>
         <p:nvSpPr>
           <p:cNvPr id="126" name="Target: Classification From Feature Analysis of The Reads Data…"/>
-          <p:cNvSpPr/>
+          <p:cNvSpPr>
+            <a:spLocks noGrp="1"/>
+          </p:cNvSpPr>
           <p:nvPr>
             <p:ph type="body" idx="1"/>
           </p:nvPr>
@@ -4119,6 +3940,175 @@
           <a:bodyPr anchor="t"/>
           <a:lstStyle/>
           <a:p>
+            <a:pPr marL="518583" indent="-518583">
+              <a:buSzPct val="75000"/>
+              <a:buChar char="•"/>
+            </a:pPr>
+            <a:r>
+              <a:rPr lang="en-US" dirty="0"/>
+              <a:t>For forensic investigation, it’s important to determine where a DNA sample was sequenced </a:t>
+            </a:r>
+          </a:p>
+          <a:p>
+            <a:pPr marL="518583" indent="-518583">
+              <a:buSzPct val="75000"/>
+              <a:buChar char="•"/>
+            </a:pPr>
+            <a:r>
+              <a:rPr lang="en-US" dirty="0"/>
+              <a:t>Datasets from different sequencing institutions  may have informative features which makes it possible to use machine learning to do the classification</a:t>
+            </a:r>
+          </a:p>
+          <a:p>
+            <a:pPr marL="518583" indent="-518583">
+              <a:buSzPct val="75000"/>
+              <a:buChar char="•"/>
+            </a:pPr>
+            <a:r>
+              <a:rPr lang="en-US" dirty="0"/>
+              <a:t>We will focus on institutions that have sequenced Escherichia coli using Illumina </a:t>
+            </a:r>
+            <a:r>
+              <a:rPr lang="en-US" dirty="0" err="1"/>
+              <a:t>MiSeqs</a:t>
+            </a:r>
+            <a:endParaRPr lang="en-US" dirty="0"/>
+          </a:p>
+          <a:p>
+            <a:pPr>
+              <a:buSzPct val="75000"/>
+              <a:buChar char="•"/>
+            </a:pPr>
+            <a:endParaRPr dirty="0"/>
+          </a:p>
+        </p:txBody>
+      </p:sp>
+      <p:pic>
+        <p:nvPicPr>
+          <p:cNvPr id="4" name="Scanning_electron_micrograph_of_an_E._coli_colony.jpg" descr="Scanning_electron_micrograph_of_an_E._coli_colony.jpg">
+            <a:extLst>
+              <a:ext uri="{FF2B5EF4-FFF2-40B4-BE49-F238E27FC236}">
+                <a16:creationId xmlns:a16="http://schemas.microsoft.com/office/drawing/2014/main" id="{D5C74389-F324-4A8D-B441-B515FF813205}"/>
+              </a:ext>
+            </a:extLst>
+          </p:cNvPr>
+          <p:cNvPicPr>
+            <a:picLocks noChangeAspect="1"/>
+          </p:cNvPicPr>
+          <p:nvPr/>
+        </p:nvPicPr>
+        <p:blipFill>
+          <a:blip r:embed="rId2">
+            <a:extLst/>
+          </a:blip>
+          <a:stretch>
+            <a:fillRect/>
+          </a:stretch>
+        </p:blipFill>
+        <p:spPr>
+          <a:xfrm>
+            <a:off x="8536700" y="6504320"/>
+            <a:ext cx="4322913" cy="2933406"/>
+          </a:xfrm>
+          <a:prstGeom prst="rect">
+            <a:avLst/>
+          </a:prstGeom>
+          <a:ln w="12700">
+            <a:miter lim="400000"/>
+          </a:ln>
+        </p:spPr>
+      </p:pic>
+    </p:spTree>
+  </p:cSld>
+  <p:clrMapOvr>
+    <a:masterClrMapping/>
+  </p:clrMapOvr>
+  <p:transition spd="med"/>
+</p:sld>
+</file>
+
+<file path=ppt/slides/slide3.xml><?xml version="1.0" encoding="utf-8"?>
+<p:sld xmlns:a="http://schemas.openxmlformats.org/drawingml/2006/main" xmlns:r="http://schemas.openxmlformats.org/officeDocument/2006/relationships" xmlns:p="http://schemas.openxmlformats.org/presentationml/2006/main">
+  <p:cSld>
+    <p:spTree>
+      <p:nvGrpSpPr>
+        <p:cNvPr id="1" name=""/>
+        <p:cNvGrpSpPr/>
+        <p:nvPr/>
+      </p:nvGrpSpPr>
+      <p:grpSpPr>
+        <a:xfrm>
+          <a:off x="0" y="0"/>
+          <a:ext cx="0" cy="0"/>
+          <a:chOff x="0" y="0"/>
+          <a:chExt cx="0" cy="0"/>
+        </a:xfrm>
+      </p:grpSpPr>
+      <p:sp>
+        <p:nvSpPr>
+          <p:cNvPr id="125" name="Project Scheme"/>
+          <p:cNvSpPr>
+            <a:spLocks noGrp="1"/>
+          </p:cNvSpPr>
+          <p:nvPr>
+            <p:ph type="title"/>
+          </p:nvPr>
+        </p:nvSpPr>
+        <p:spPr>
+          <a:xfrm>
+            <a:off x="322407" y="418997"/>
+            <a:ext cx="6643140" cy="1136058"/>
+          </a:xfrm>
+          <a:prstGeom prst="rect">
+            <a:avLst/>
+          </a:prstGeom>
+        </p:spPr>
+        <p:txBody>
+          <a:bodyPr/>
+          <a:lstStyle/>
+          <a:p>
+            <a:pPr defTabSz="549148">
+              <a:defRPr sz="6768">
+                <a:solidFill>
+                  <a:srgbClr val="FFFB00"/>
+                </a:solidFill>
+                <a:effectLst>
+                  <a:outerShdw blurRad="47752" dist="35814" dir="5400000" rotWithShape="0">
+                    <a:srgbClr val="000000"/>
+                  </a:outerShdw>
+                </a:effectLst>
+              </a:defRPr>
+            </a:pPr>
+            <a:r>
+              <a:rPr dirty="0"/>
+              <a:t>Project Scheme</a:t>
+            </a:r>
+          </a:p>
+        </p:txBody>
+      </p:sp>
+      <p:sp>
+        <p:nvSpPr>
+          <p:cNvPr id="126" name="Target: Classification From Feature Analysis of The Reads Data…"/>
+          <p:cNvSpPr>
+            <a:spLocks noGrp="1"/>
+          </p:cNvSpPr>
+          <p:nvPr>
+            <p:ph type="body" idx="1"/>
+          </p:nvPr>
+        </p:nvSpPr>
+        <p:spPr>
+          <a:xfrm>
+            <a:off x="680870" y="2019299"/>
+            <a:ext cx="11751866" cy="6402237"/>
+          </a:xfrm>
+          <a:prstGeom prst="rect">
+            <a:avLst/>
+          </a:prstGeom>
+        </p:spPr>
+        <p:txBody>
+          <a:bodyPr anchor="t"/>
+          <a:lstStyle/>
+          <a:p>
             <a:pPr>
               <a:buSzPct val="75000"/>
               <a:buChar char="•"/>
@@ -4145,7 +4135,7 @@
             </a:r>
           </a:p>
           <a:p>
-            <a:pPr lvl="4" marL="0" indent="914400">
+            <a:pPr marL="0" lvl="4" indent="914400">
               <a:buSzTx/>
               <a:buNone/>
             </a:pPr>
@@ -4154,7 +4144,7 @@
             </a:r>
           </a:p>
           <a:p>
-            <a:pPr lvl="4" marL="0" indent="914400">
+            <a:pPr marL="0" lvl="4" indent="914400">
               <a:buSzTx/>
               <a:buNone/>
             </a:pPr>
@@ -4165,16 +4155,21 @@
         </p:txBody>
       </p:sp>
     </p:spTree>
+    <p:extLst>
+      <p:ext uri="{BB962C8B-B14F-4D97-AF65-F5344CB8AC3E}">
+        <p14:creationId xmlns:p14="http://schemas.microsoft.com/office/powerpoint/2010/main" val="1650016943"/>
+      </p:ext>
+    </p:extLst>
   </p:cSld>
   <p:clrMapOvr>
     <a:masterClrMapping/>
   </p:clrMapOvr>
-  <p:transition xmlns:p14="http://schemas.microsoft.com/office/powerpoint/2010/main" spd="med" advClick="1"/>
+  <p:transition spd="med"/>
 </p:sld>
 </file>
 
 <file path=ppt/slides/slide4.xml><?xml version="1.0" encoding="utf-8"?>
-<p:sld xmlns:a="http://schemas.openxmlformats.org/drawingml/2006/main" xmlns:r="http://schemas.openxmlformats.org/officeDocument/2006/relationships" xmlns:p="http://schemas.openxmlformats.org/presentationml/2006/main" showMasterSp="1" showMasterPhAnim="1">
+<p:sld xmlns:a="http://schemas.openxmlformats.org/drawingml/2006/main" xmlns:r="http://schemas.openxmlformats.org/officeDocument/2006/relationships" xmlns:p="http://schemas.openxmlformats.org/presentationml/2006/main">
   <p:cSld>
     <p:spTree>
       <p:nvGrpSpPr>
@@ -4224,12 +4219,12 @@
   <p:clrMapOvr>
     <a:masterClrMapping/>
   </p:clrMapOvr>
-  <p:transition xmlns:p14="http://schemas.microsoft.com/office/powerpoint/2010/main" spd="med" advClick="1"/>
+  <p:transition spd="med"/>
 </p:sld>
 </file>
 
 <file path=ppt/slides/slide5.xml><?xml version="1.0" encoding="utf-8"?>
-<p:sld xmlns:a="http://schemas.openxmlformats.org/drawingml/2006/main" xmlns:r="http://schemas.openxmlformats.org/officeDocument/2006/relationships" xmlns:p="http://schemas.openxmlformats.org/presentationml/2006/main" showMasterSp="1" showMasterPhAnim="1">
+<p:sld xmlns:a="http://schemas.openxmlformats.org/drawingml/2006/main" xmlns:r="http://schemas.openxmlformats.org/officeDocument/2006/relationships" xmlns:p="http://schemas.openxmlformats.org/presentationml/2006/main">
   <p:cSld>
     <p:spTree>
       <p:nvGrpSpPr>
@@ -4248,7 +4243,9 @@
       <p:sp>
         <p:nvSpPr>
           <p:cNvPr id="130" name="Project Scheme"/>
-          <p:cNvSpPr/>
+          <p:cNvSpPr>
+            <a:spLocks noGrp="1"/>
+          </p:cNvSpPr>
           <p:nvPr>
             <p:ph type="title"/>
           </p:nvPr>
@@ -4272,17 +4269,14 @@
                   <a:srgbClr val="FFFB00"/>
                 </a:solidFill>
                 <a:effectLst>
-                  <a:outerShdw sx="100000" sy="100000" kx="0" ky="0" algn="b" rotWithShape="0" blurRad="47752" dist="35814" dir="5400000">
+                  <a:outerShdw blurRad="47752" dist="35814" dir="5400000" rotWithShape="0">
                     <a:srgbClr val="000000"/>
                   </a:outerShdw>
                 </a:effectLst>
               </a:defRPr>
             </a:pPr>
             <a:r>
-              <a:t>Project S</a:t>
-            </a:r>
-            <a:r>
-              <a:t>cheme</a:t>
+              <a:t>Project Scheme</a:t>
             </a:r>
           </a:p>
         </p:txBody>
@@ -4290,7 +4284,9 @@
       <p:sp>
         <p:nvSpPr>
           <p:cNvPr id="131" name="Target: Classification From Feature Analysis of The Reads Data…"/>
-          <p:cNvSpPr/>
+          <p:cNvSpPr>
+            <a:spLocks noGrp="1"/>
+          </p:cNvSpPr>
           <p:nvPr>
             <p:ph type="body" idx="1"/>
           </p:nvPr>
@@ -4313,6 +4309,7 @@
               <a:buChar char="•"/>
             </a:pPr>
             <a:r>
+              <a:rPr dirty="0"/>
               <a:t>Target: Classification From Feature Analysis of The Reads Data</a:t>
             </a:r>
           </a:p>
@@ -4322,6 +4319,7 @@
               <a:buChar char="•"/>
             </a:pPr>
             <a:r>
+              <a:rPr dirty="0"/>
               <a:t>Data: SRA</a:t>
             </a:r>
           </a:p>
@@ -4336,24 +4334,20 @@
               </a:defRPr>
             </a:pPr>
             <a:r>
+              <a:rPr dirty="0"/>
               <a:t>Features:  </a:t>
             </a:r>
             <a:r>
-              <a:rPr>
+              <a:rPr dirty="0">
                 <a:solidFill>
                   <a:srgbClr val="FFFFFF"/>
                 </a:solidFill>
               </a:rPr>
               <a:t>three types of features taken into account</a:t>
             </a:r>
-            <a:endParaRPr>
-              <a:solidFill>
-                <a:srgbClr val="FFFFFF"/>
-              </a:solidFill>
-            </a:endParaRPr>
-          </a:p>
-          <a:p>
-            <a:pPr lvl="4" marL="0" indent="914400">
+          </a:p>
+          <a:p>
+            <a:pPr marL="0" lvl="4" indent="914400">
               <a:buSzTx/>
               <a:buNone/>
               <a:defRPr>
@@ -4363,21 +4357,32 @@
               </a:defRPr>
             </a:pPr>
             <a:r>
-              <a:rPr>
+              <a:rPr dirty="0">
                 <a:solidFill>
                   <a:srgbClr val="FFFFFF"/>
                 </a:solidFill>
               </a:rPr>
-              <a:t>1. length of the reads: average fragment size</a:t>
-            </a:r>
-            <a:endParaRPr>
-              <a:solidFill>
-                <a:srgbClr val="FFFFFF"/>
-              </a:solidFill>
-            </a:endParaRPr>
-          </a:p>
-          <a:p>
-            <a:pPr lvl="4" marL="0" indent="914400">
+              <a:t>1. </a:t>
+            </a:r>
+            <a:r>
+              <a:rPr lang="en-US" dirty="0">
+                <a:solidFill>
+                  <a:srgbClr val="FFFFFF"/>
+                </a:solidFill>
+              </a:rPr>
+              <a:t>Distribution of </a:t>
+            </a:r>
+            <a:r>
+              <a:rPr dirty="0">
+                <a:solidFill>
+                  <a:srgbClr val="FFFFFF"/>
+                </a:solidFill>
+              </a:rPr>
+              <a:t>fragment size</a:t>
+            </a:r>
+          </a:p>
+          <a:p>
+            <a:pPr marL="0" lvl="4" indent="914400">
               <a:buSzTx/>
               <a:buNone/>
               <a:defRPr>
@@ -4387,12 +4392,32 @@
               </a:defRPr>
             </a:pPr>
             <a:r>
-              <a:rPr>
+              <a:rPr dirty="0">
                 <a:solidFill>
                   <a:srgbClr val="FFFFFF"/>
                 </a:solidFill>
               </a:rPr>
               <a:t>2. 4-mers with/without N (4^5=512 why?)</a:t>
+            </a:r>
+            <a:endParaRPr lang="en-US" dirty="0"/>
+          </a:p>
+          <a:p>
+            <a:pPr marL="0" lvl="4" indent="914400">
+              <a:buSzTx/>
+              <a:buNone/>
+              <a:defRPr>
+                <a:solidFill>
+                  <a:srgbClr val="00FDFF"/>
+                </a:solidFill>
+              </a:defRPr>
+            </a:pPr>
+            <a:r>
+              <a:rPr lang="en-US" dirty="0">
+                <a:solidFill>
+                  <a:srgbClr val="FFFFFF"/>
+                </a:solidFill>
+              </a:rPr>
+              <a:t>3. Distribution of quality scores</a:t>
             </a:r>
           </a:p>
         </p:txBody>
@@ -4402,12 +4427,12 @@
   <p:clrMapOvr>
     <a:masterClrMapping/>
   </p:clrMapOvr>
-  <p:transition xmlns:p14="http://schemas.microsoft.com/office/powerpoint/2010/main" spd="med" advClick="1"/>
+  <p:transition spd="med"/>
 </p:sld>
 </file>
 
 <file path=ppt/slides/slide6.xml><?xml version="1.0" encoding="utf-8"?>
-<p:sld xmlns:a="http://schemas.openxmlformats.org/drawingml/2006/main" xmlns:r="http://schemas.openxmlformats.org/officeDocument/2006/relationships" xmlns:p="http://schemas.openxmlformats.org/presentationml/2006/main" showMasterSp="1" showMasterPhAnim="1">
+<p:sld xmlns:a="http://schemas.openxmlformats.org/drawingml/2006/main" xmlns:r="http://schemas.openxmlformats.org/officeDocument/2006/relationships" xmlns:p="http://schemas.openxmlformats.org/presentationml/2006/main">
   <p:cSld>
     <p:spTree>
       <p:nvGrpSpPr>
@@ -4426,7 +4451,9 @@
       <p:sp>
         <p:nvSpPr>
           <p:cNvPr id="133" name="intro to 4-mers with N"/>
-          <p:cNvSpPr/>
+          <p:cNvSpPr>
+            <a:spLocks noGrp="1"/>
+          </p:cNvSpPr>
           <p:nvPr>
             <p:ph type="body" sz="quarter" idx="1"/>
           </p:nvPr>
@@ -4451,7 +4478,7 @@
               <a:buNone/>
               <a:defRPr sz="3024">
                 <a:effectLst>
-                  <a:outerShdw sx="100000" sy="100000" kx="0" ky="0" algn="b" rotWithShape="0" blurRad="42672" dist="32004" dir="5400000">
+                  <a:outerShdw blurRad="42672" dist="32004" dir="5400000" rotWithShape="0">
                     <a:srgbClr val="000000"/>
                   </a:outerShdw>
                 </a:effectLst>
@@ -4459,7 +4486,6 @@
             </a:lvl1pPr>
           </a:lstStyle>
           <a:p>
-            <a:pPr/>
             <a:r>
               <a:t>intro to 4-mers with N </a:t>
             </a:r>
@@ -4514,7 +4540,7 @@
           </a:ln>
           <a:extLst>
             <a:ext uri="{C572A759-6A51-4108-AA02-DFA0A04FC94B}">
-              <ma14:wrappingTextBoxFlag xmlns:ma14="http://schemas.microsoft.com/office/mac/drawingml/2011/main" val="1"/>
+              <ma14:wrappingTextBoxFlag xmlns:ma14="http://schemas.microsoft.com/office/mac/drawingml/2011/main" xmlns="" val="1"/>
             </a:ext>
           </a:extLst>
         </p:spPr>
@@ -4542,12 +4568,12 @@
   <p:clrMapOvr>
     <a:masterClrMapping/>
   </p:clrMapOvr>
-  <p:transition xmlns:p14="http://schemas.microsoft.com/office/powerpoint/2010/main" spd="med" advClick="1"/>
+  <p:transition spd="med"/>
 </p:sld>
 </file>
 
 <file path=ppt/slides/slide7.xml><?xml version="1.0" encoding="utf-8"?>
-<p:sld xmlns:a="http://schemas.openxmlformats.org/drawingml/2006/main" xmlns:r="http://schemas.openxmlformats.org/officeDocument/2006/relationships" xmlns:p="http://schemas.openxmlformats.org/presentationml/2006/main" showMasterSp="1" showMasterPhAnim="1">
+<p:sld xmlns:a="http://schemas.openxmlformats.org/drawingml/2006/main" xmlns:r="http://schemas.openxmlformats.org/officeDocument/2006/relationships" xmlns:p="http://schemas.openxmlformats.org/presentationml/2006/main">
   <p:cSld>
     <p:spTree>
       <p:nvGrpSpPr>
@@ -4566,7 +4592,9 @@
       <p:sp>
         <p:nvSpPr>
           <p:cNvPr id="137" name="Project Scheme"/>
-          <p:cNvSpPr/>
+          <p:cNvSpPr>
+            <a:spLocks noGrp="1"/>
+          </p:cNvSpPr>
           <p:nvPr>
             <p:ph type="title"/>
           </p:nvPr>
@@ -4590,17 +4618,14 @@
                   <a:srgbClr val="FFFB00"/>
                 </a:solidFill>
                 <a:effectLst>
-                  <a:outerShdw sx="100000" sy="100000" kx="0" ky="0" algn="b" rotWithShape="0" blurRad="47752" dist="35814" dir="5400000">
+                  <a:outerShdw blurRad="47752" dist="35814" dir="5400000" rotWithShape="0">
                     <a:srgbClr val="000000"/>
                   </a:outerShdw>
                 </a:effectLst>
               </a:defRPr>
             </a:pPr>
             <a:r>
-              <a:t>Project S</a:t>
-            </a:r>
-            <a:r>
-              <a:t>cheme</a:t>
+              <a:t>Project Scheme</a:t>
             </a:r>
           </a:p>
         </p:txBody>
@@ -4608,7 +4633,9 @@
       <p:sp>
         <p:nvSpPr>
           <p:cNvPr id="138" name="Target: Classification From Feature Analysis of The Reads Data…"/>
-          <p:cNvSpPr/>
+          <p:cNvSpPr>
+            <a:spLocks noGrp="1"/>
+          </p:cNvSpPr>
           <p:nvPr>
             <p:ph type="body" idx="1"/>
           </p:nvPr>
@@ -4664,14 +4691,9 @@
               </a:rPr>
               <a:t>three types of features taken into account</a:t>
             </a:r>
-            <a:endParaRPr>
-              <a:solidFill>
-                <a:srgbClr val="FFFFFF"/>
-              </a:solidFill>
-            </a:endParaRPr>
-          </a:p>
-          <a:p>
-            <a:pPr lvl="4" marL="0" indent="914400">
+          </a:p>
+          <a:p>
+            <a:pPr marL="0" lvl="4" indent="914400">
               <a:buSzTx/>
               <a:buNone/>
               <a:defRPr>
@@ -4688,14 +4710,9 @@
               </a:rPr>
               <a:t>1. length of the reads</a:t>
             </a:r>
-            <a:endParaRPr>
-              <a:solidFill>
-                <a:srgbClr val="FFFFFF"/>
-              </a:solidFill>
-            </a:endParaRPr>
-          </a:p>
-          <a:p>
-            <a:pPr lvl="4" marL="0" indent="914400">
+          </a:p>
+          <a:p>
+            <a:pPr marL="0" lvl="4" indent="914400">
               <a:buSzTx/>
               <a:buNone/>
               <a:defRPr>
@@ -4712,14 +4729,9 @@
               </a:rPr>
               <a:t>2. 4-mers (5^4=625)</a:t>
             </a:r>
-            <a:endParaRPr>
-              <a:solidFill>
-                <a:srgbClr val="FFFFFF"/>
-              </a:solidFill>
-            </a:endParaRPr>
-          </a:p>
-          <a:p>
-            <a:pPr lvl="4" marL="0" indent="914400">
+          </a:p>
+          <a:p>
+            <a:pPr marL="0" lvl="4" indent="914400">
               <a:buSzTx/>
               <a:buNone/>
               <a:defRPr>
@@ -4744,12 +4756,12 @@
   <p:clrMapOvr>
     <a:masterClrMapping/>
   </p:clrMapOvr>
-  <p:transition xmlns:p14="http://schemas.microsoft.com/office/powerpoint/2010/main" spd="med" advClick="1"/>
+  <p:transition spd="med"/>
 </p:sld>
 </file>
 
 <file path=ppt/slides/slide8.xml><?xml version="1.0" encoding="utf-8"?>
-<p:sld xmlns:a="http://schemas.openxmlformats.org/drawingml/2006/main" xmlns:r="http://schemas.openxmlformats.org/officeDocument/2006/relationships" xmlns:p="http://schemas.openxmlformats.org/presentationml/2006/main" showMasterSp="1" showMasterPhAnim="1">
+<p:sld xmlns:a="http://schemas.openxmlformats.org/drawingml/2006/main" xmlns:r="http://schemas.openxmlformats.org/officeDocument/2006/relationships" xmlns:p="http://schemas.openxmlformats.org/presentationml/2006/main">
   <p:cSld>
     <p:spTree>
       <p:nvGrpSpPr>
@@ -4768,7 +4780,9 @@
       <p:sp>
         <p:nvSpPr>
           <p:cNvPr id="140" name="Quality distribution"/>
-          <p:cNvSpPr/>
+          <p:cNvSpPr>
+            <a:spLocks noGrp="1"/>
+          </p:cNvSpPr>
           <p:nvPr>
             <p:ph type="title"/>
           </p:nvPr>
@@ -4783,12 +4797,14 @@
           </a:prstGeom>
         </p:spPr>
         <p:txBody>
-          <a:bodyPr/>
+          <a:bodyPr>
+            <a:normAutofit fontScale="90000"/>
+          </a:bodyPr>
           <a:lstStyle>
             <a:lvl1pPr defTabSz="286258">
               <a:defRPr sz="3528">
                 <a:effectLst>
-                  <a:outerShdw sx="100000" sy="100000" kx="0" ky="0" algn="b" rotWithShape="0" blurRad="24892" dist="18669" dir="5400000">
+                  <a:outerShdw blurRad="24892" dist="18669" dir="5400000" rotWithShape="0">
                     <a:srgbClr val="000000"/>
                   </a:outerShdw>
                 </a:effectLst>
@@ -4796,7 +4812,6 @@
             </a:lvl1pPr>
           </a:lstStyle>
           <a:p>
-            <a:pPr/>
             <a:r>
               <a:t>Quality distribution</a:t>
             </a:r>
@@ -4837,12 +4852,12 @@
   <p:clrMapOvr>
     <a:masterClrMapping/>
   </p:clrMapOvr>
-  <p:transition xmlns:p14="http://schemas.microsoft.com/office/powerpoint/2010/main" spd="med" advClick="1"/>
+  <p:transition spd="med"/>
 </p:sld>
 </file>
 
 <file path=ppt/slides/slide9.xml><?xml version="1.0" encoding="utf-8"?>
-<p:sld xmlns:a="http://schemas.openxmlformats.org/drawingml/2006/main" xmlns:r="http://schemas.openxmlformats.org/officeDocument/2006/relationships" xmlns:p="http://schemas.openxmlformats.org/presentationml/2006/main" showMasterSp="1" showMasterPhAnim="1">
+<p:sld xmlns:a="http://schemas.openxmlformats.org/drawingml/2006/main" xmlns:r="http://schemas.openxmlformats.org/officeDocument/2006/relationships" xmlns:p="http://schemas.openxmlformats.org/presentationml/2006/main">
   <p:cSld>
     <p:spTree>
       <p:nvGrpSpPr>
@@ -4861,7 +4876,9 @@
       <p:sp>
         <p:nvSpPr>
           <p:cNvPr id="143" name="Project Scheme"/>
-          <p:cNvSpPr/>
+          <p:cNvSpPr>
+            <a:spLocks noGrp="1"/>
+          </p:cNvSpPr>
           <p:nvPr>
             <p:ph type="title"/>
           </p:nvPr>
@@ -4885,17 +4902,14 @@
                   <a:srgbClr val="FFFB00"/>
                 </a:solidFill>
                 <a:effectLst>
-                  <a:outerShdw sx="100000" sy="100000" kx="0" ky="0" algn="b" rotWithShape="0" blurRad="47752" dist="35814" dir="5400000">
+                  <a:outerShdw blurRad="47752" dist="35814" dir="5400000" rotWithShape="0">
                     <a:srgbClr val="000000"/>
                   </a:outerShdw>
                 </a:effectLst>
               </a:defRPr>
             </a:pPr>
             <a:r>
-              <a:t>Project S</a:t>
-            </a:r>
-            <a:r>
-              <a:t>cheme</a:t>
+              <a:t>Project Scheme</a:t>
             </a:r>
           </a:p>
         </p:txBody>
@@ -4903,7 +4917,9 @@
       <p:sp>
         <p:nvSpPr>
           <p:cNvPr id="144" name="Target: Classification From Feature Analysis of The Reads Data…"/>
-          <p:cNvSpPr/>
+          <p:cNvSpPr>
+            <a:spLocks noGrp="1"/>
+          </p:cNvSpPr>
           <p:nvPr>
             <p:ph type="body" idx="1"/>
           </p:nvPr>
@@ -4968,14 +4984,9 @@
               </a:rPr>
               <a:t>60% train, 20% validation, 20% test</a:t>
             </a:r>
-            <a:endParaRPr>
-              <a:solidFill>
-                <a:srgbClr val="FFFFFF"/>
-              </a:solidFill>
-            </a:endParaRPr>
-          </a:p>
-          <a:p>
-            <a:pPr lvl="4" marL="0" indent="914400">
+          </a:p>
+          <a:p>
+            <a:pPr marL="0" lvl="4" indent="914400">
               <a:buSzTx/>
               <a:buNone/>
             </a:pPr>
@@ -4984,7 +4995,7 @@
             </a:r>
           </a:p>
           <a:p>
-            <a:pPr lvl="4" marL="0" indent="914400">
+            <a:pPr marL="0" lvl="4" indent="914400">
               <a:buSzTx/>
               <a:buNone/>
             </a:pPr>
@@ -4999,12 +5010,12 @@
   <p:clrMapOvr>
     <a:masterClrMapping/>
   </p:clrMapOvr>
-  <p:transition xmlns:p14="http://schemas.microsoft.com/office/powerpoint/2010/main" spd="med" advClick="1"/>
+  <p:transition spd="med"/>
 </p:sld>
 </file>
 
 <file path=ppt/theme/theme1.xml><?xml version="1.0" encoding="utf-8"?>
-<a:theme xmlns:a="http://schemas.openxmlformats.org/drawingml/2006/main" xmlns:r="http://schemas.openxmlformats.org/officeDocument/2006/relationships" name="Industrial">
+<a:theme xmlns:a="http://schemas.openxmlformats.org/drawingml/2006/main" name="Industrial">
   <a:themeElements>
     <a:clrScheme name="Industrial">
       <a:dk1>
@@ -5194,8 +5205,8 @@
     <a:spDef>
       <a:spPr>
         <a:blipFill rotWithShape="1">
-          <a:blip r:embed="rId1"/>
-          <a:srcRect l="0" t="0" r="0" b="0"/>
+          <a:blip xmlns:r="http://schemas.openxmlformats.org/officeDocument/2006/relationships" r:embed="rId1"/>
+          <a:srcRect/>
           <a:tile tx="0" ty="0" sx="100000" sy="100000" flip="none" algn="tl"/>
         </a:blipFill>
         <a:ln w="12700" cap="flat">
@@ -5205,7 +5216,7 @@
         <a:effectLst/>
         <a:sp3d/>
       </a:spPr>
-      <a:bodyPr rot="0" spcFirstLastPara="1" vertOverflow="overflow" horzOverflow="overflow" vert="horz" wrap="square" lIns="50800" tIns="50800" rIns="50800" bIns="50800" numCol="1" spcCol="38100" rtlCol="0" anchor="ctr" upright="0">
+      <a:bodyPr rot="0" spcFirstLastPara="1" vertOverflow="overflow" horzOverflow="overflow" vert="horz" wrap="square" lIns="50800" tIns="50800" rIns="50800" bIns="50800" numCol="1" spcCol="38100" rtlCol="0" anchor="ctr">
         <a:spAutoFit/>
       </a:bodyPr>
       <a:lstStyle>
@@ -5224,7 +5235,7 @@
           <a:buFontTx/>
           <a:buNone/>
           <a:tabLst/>
-          <a:defRPr b="0" baseline="0" cap="none" i="0" spc="0" strike="noStrike" sz="3600" u="none" kumimoji="0" normalizeH="0">
+          <a:defRPr kumimoji="0" sz="3600" b="0" i="0" u="none" strike="noStrike" cap="none" spc="0" normalizeH="0" baseline="0">
             <a:ln>
               <a:noFill/>
             </a:ln>
@@ -5232,7 +5243,7 @@
               <a:srgbClr val="FFFFFF"/>
             </a:solidFill>
             <a:effectLst>
-              <a:outerShdw sx="100000" sy="100000" kx="0" ky="0" algn="b" rotWithShape="0" blurRad="50800" dist="38100" dir="5400000">
+              <a:outerShdw blurRad="50800" dist="38100" dir="5400000" rotWithShape="0">
                 <a:srgbClr val="000000"/>
               </a:outerShdw>
             </a:effectLst>
@@ -5258,7 +5269,7 @@
           <a:buFontTx/>
           <a:buNone/>
           <a:tabLst/>
-          <a:defRPr b="0" baseline="0" cap="none" i="0" spc="0" strike="noStrike" sz="1800" u="none" kumimoji="0" normalizeH="0">
+          <a:defRPr kumimoji="0" sz="1800" b="0" i="0" u="none" strike="noStrike" cap="none" spc="0" normalizeH="0" baseline="0">
             <a:ln>
               <a:noFill/>
             </a:ln>
@@ -5284,7 +5295,7 @@
           <a:buFontTx/>
           <a:buNone/>
           <a:tabLst/>
-          <a:defRPr b="0" baseline="0" cap="none" i="0" spc="0" strike="noStrike" sz="1800" u="none" kumimoji="0" normalizeH="0">
+          <a:defRPr kumimoji="0" sz="1800" b="0" i="0" u="none" strike="noStrike" cap="none" spc="0" normalizeH="0" baseline="0">
             <a:ln>
               <a:noFill/>
             </a:ln>
@@ -5310,7 +5321,7 @@
           <a:buFontTx/>
           <a:buNone/>
           <a:tabLst/>
-          <a:defRPr b="0" baseline="0" cap="none" i="0" spc="0" strike="noStrike" sz="1800" u="none" kumimoji="0" normalizeH="0">
+          <a:defRPr kumimoji="0" sz="1800" b="0" i="0" u="none" strike="noStrike" cap="none" spc="0" normalizeH="0" baseline="0">
             <a:ln>
               <a:noFill/>
             </a:ln>
@@ -5336,7 +5347,7 @@
           <a:buFontTx/>
           <a:buNone/>
           <a:tabLst/>
-          <a:defRPr b="0" baseline="0" cap="none" i="0" spc="0" strike="noStrike" sz="1800" u="none" kumimoji="0" normalizeH="0">
+          <a:defRPr kumimoji="0" sz="1800" b="0" i="0" u="none" strike="noStrike" cap="none" spc="0" normalizeH="0" baseline="0">
             <a:ln>
               <a:noFill/>
             </a:ln>
@@ -5362,7 +5373,7 @@
           <a:buFontTx/>
           <a:buNone/>
           <a:tabLst/>
-          <a:defRPr b="0" baseline="0" cap="none" i="0" spc="0" strike="noStrike" sz="1800" u="none" kumimoji="0" normalizeH="0">
+          <a:defRPr kumimoji="0" sz="1800" b="0" i="0" u="none" strike="noStrike" cap="none" spc="0" normalizeH="0" baseline="0">
             <a:ln>
               <a:noFill/>
             </a:ln>
@@ -5388,7 +5399,7 @@
           <a:buFontTx/>
           <a:buNone/>
           <a:tabLst/>
-          <a:defRPr b="0" baseline="0" cap="none" i="0" spc="0" strike="noStrike" sz="1800" u="none" kumimoji="0" normalizeH="0">
+          <a:defRPr kumimoji="0" sz="1800" b="0" i="0" u="none" strike="noStrike" cap="none" spc="0" normalizeH="0" baseline="0">
             <a:ln>
               <a:noFill/>
             </a:ln>
@@ -5414,7 +5425,7 @@
           <a:buFontTx/>
           <a:buNone/>
           <a:tabLst/>
-          <a:defRPr b="0" baseline="0" cap="none" i="0" spc="0" strike="noStrike" sz="1800" u="none" kumimoji="0" normalizeH="0">
+          <a:defRPr kumimoji="0" sz="1800" b="0" i="0" u="none" strike="noStrike" cap="none" spc="0" normalizeH="0" baseline="0">
             <a:ln>
               <a:noFill/>
             </a:ln>
@@ -5440,7 +5451,7 @@
           <a:buFontTx/>
           <a:buNone/>
           <a:tabLst/>
-          <a:defRPr b="0" baseline="0" cap="none" i="0" spc="0" strike="noStrike" sz="1800" u="none" kumimoji="0" normalizeH="0">
+          <a:defRPr kumimoji="0" sz="1800" b="0" i="0" u="none" strike="noStrike" cap="none" spc="0" normalizeH="0" baseline="0">
             <a:ln>
               <a:noFill/>
             </a:ln>
@@ -5466,7 +5477,7 @@
           <a:buFontTx/>
           <a:buNone/>
           <a:tabLst/>
-          <a:defRPr b="0" baseline="0" cap="none" i="0" spc="0" strike="noStrike" sz="1800" u="none" kumimoji="0" normalizeH="0">
+          <a:defRPr kumimoji="0" sz="1800" b="0" i="0" u="none" strike="noStrike" cap="none" spc="0" normalizeH="0" baseline="0">
             <a:ln>
               <a:noFill/>
             </a:ln>
@@ -5479,9 +5490,15 @@
         </a:lvl9pPr>
       </a:lstStyle>
       <a:style>
-        <a:lnRef idx="0"/>
-        <a:fillRef idx="0"/>
-        <a:effectRef idx="0"/>
+        <a:lnRef idx="0">
+          <a:scrgbClr r="0" g="0" b="0"/>
+        </a:lnRef>
+        <a:fillRef idx="0">
+          <a:scrgbClr r="0" g="0" b="0"/>
+        </a:fillRef>
+        <a:effectRef idx="0">
+          <a:scrgbClr r="0" g="0" b="0"/>
+        </a:effectRef>
         <a:fontRef idx="none"/>
       </a:style>
     </a:spDef>
@@ -5498,7 +5515,7 @@
         <a:effectLst/>
         <a:sp3d/>
       </a:spPr>
-      <a:bodyPr rot="0" spcFirstLastPara="1" vertOverflow="overflow" horzOverflow="overflow" vert="horz" wrap="square" lIns="91439" tIns="45719" rIns="91439" bIns="45719" numCol="1" spcCol="38100" rtlCol="0" anchor="t" upright="0">
+      <a:bodyPr rot="0" spcFirstLastPara="1" vertOverflow="overflow" horzOverflow="overflow" vert="horz" wrap="square" lIns="91439" tIns="45719" rIns="91439" bIns="45719" numCol="1" spcCol="38100" rtlCol="0" anchor="t">
         <a:noAutofit/>
       </a:bodyPr>
       <a:lstStyle>
@@ -5517,7 +5534,7 @@
           <a:buFontTx/>
           <a:buNone/>
           <a:tabLst/>
-          <a:defRPr b="0" baseline="0" cap="none" i="0" spc="0" strike="noStrike" sz="1800" u="none" kumimoji="0" normalizeH="0">
+          <a:defRPr kumimoji="0" sz="1800" b="0" i="0" u="none" strike="noStrike" cap="none" spc="0" normalizeH="0" baseline="0">
             <a:ln>
               <a:noFill/>
             </a:ln>
@@ -5543,7 +5560,7 @@
           <a:buFontTx/>
           <a:buNone/>
           <a:tabLst/>
-          <a:defRPr b="0" baseline="0" cap="none" i="0" spc="0" strike="noStrike" sz="1800" u="none" kumimoji="0" normalizeH="0">
+          <a:defRPr kumimoji="0" sz="1800" b="0" i="0" u="none" strike="noStrike" cap="none" spc="0" normalizeH="0" baseline="0">
             <a:ln>
               <a:noFill/>
             </a:ln>
@@ -5569,7 +5586,7 @@
           <a:buFontTx/>
           <a:buNone/>
           <a:tabLst/>
-          <a:defRPr b="0" baseline="0" cap="none" i="0" spc="0" strike="noStrike" sz="1800" u="none" kumimoji="0" normalizeH="0">
+          <a:defRPr kumimoji="0" sz="1800" b="0" i="0" u="none" strike="noStrike" cap="none" spc="0" normalizeH="0" baseline="0">
             <a:ln>
               <a:noFill/>
             </a:ln>
@@ -5595,7 +5612,7 @@
           <a:buFontTx/>
           <a:buNone/>
           <a:tabLst/>
-          <a:defRPr b="0" baseline="0" cap="none" i="0" spc="0" strike="noStrike" sz="1800" u="none" kumimoji="0" normalizeH="0">
+          <a:defRPr kumimoji="0" sz="1800" b="0" i="0" u="none" strike="noStrike" cap="none" spc="0" normalizeH="0" baseline="0">
             <a:ln>
               <a:noFill/>
             </a:ln>
@@ -5621,7 +5638,7 @@
           <a:buFontTx/>
           <a:buNone/>
           <a:tabLst/>
-          <a:defRPr b="0" baseline="0" cap="none" i="0" spc="0" strike="noStrike" sz="1800" u="none" kumimoji="0" normalizeH="0">
+          <a:defRPr kumimoji="0" sz="1800" b="0" i="0" u="none" strike="noStrike" cap="none" spc="0" normalizeH="0" baseline="0">
             <a:ln>
               <a:noFill/>
             </a:ln>
@@ -5647,7 +5664,7 @@
           <a:buFontTx/>
           <a:buNone/>
           <a:tabLst/>
-          <a:defRPr b="0" baseline="0" cap="none" i="0" spc="0" strike="noStrike" sz="1800" u="none" kumimoji="0" normalizeH="0">
+          <a:defRPr kumimoji="0" sz="1800" b="0" i="0" u="none" strike="noStrike" cap="none" spc="0" normalizeH="0" baseline="0">
             <a:ln>
               <a:noFill/>
             </a:ln>
@@ -5673,7 +5690,7 @@
           <a:buFontTx/>
           <a:buNone/>
           <a:tabLst/>
-          <a:defRPr b="0" baseline="0" cap="none" i="0" spc="0" strike="noStrike" sz="1800" u="none" kumimoji="0" normalizeH="0">
+          <a:defRPr kumimoji="0" sz="1800" b="0" i="0" u="none" strike="noStrike" cap="none" spc="0" normalizeH="0" baseline="0">
             <a:ln>
               <a:noFill/>
             </a:ln>
@@ -5699,7 +5716,7 @@
           <a:buFontTx/>
           <a:buNone/>
           <a:tabLst/>
-          <a:defRPr b="0" baseline="0" cap="none" i="0" spc="0" strike="noStrike" sz="1800" u="none" kumimoji="0" normalizeH="0">
+          <a:defRPr kumimoji="0" sz="1800" b="0" i="0" u="none" strike="noStrike" cap="none" spc="0" normalizeH="0" baseline="0">
             <a:ln>
               <a:noFill/>
             </a:ln>
@@ -5725,7 +5742,7 @@
           <a:buFontTx/>
           <a:buNone/>
           <a:tabLst/>
-          <a:defRPr b="0" baseline="0" cap="none" i="0" spc="0" strike="noStrike" sz="1800" u="none" kumimoji="0" normalizeH="0">
+          <a:defRPr kumimoji="0" sz="1800" b="0" i="0" u="none" strike="noStrike" cap="none" spc="0" normalizeH="0" baseline="0">
             <a:ln>
               <a:noFill/>
             </a:ln>
@@ -5751,7 +5768,7 @@
           <a:buFontTx/>
           <a:buNone/>
           <a:tabLst/>
-          <a:defRPr b="0" baseline="0" cap="none" i="0" spc="0" strike="noStrike" sz="1800" u="none" kumimoji="0" normalizeH="0">
+          <a:defRPr kumimoji="0" sz="1800" b="0" i="0" u="none" strike="noStrike" cap="none" spc="0" normalizeH="0" baseline="0">
             <a:ln>
               <a:noFill/>
             </a:ln>
@@ -5764,9 +5781,15 @@
         </a:lvl9pPr>
       </a:lstStyle>
       <a:style>
-        <a:lnRef idx="0"/>
-        <a:fillRef idx="0"/>
-        <a:effectRef idx="0"/>
+        <a:lnRef idx="0">
+          <a:scrgbClr r="0" g="0" b="0"/>
+        </a:lnRef>
+        <a:fillRef idx="0">
+          <a:scrgbClr r="0" g="0" b="0"/>
+        </a:fillRef>
+        <a:effectRef idx="0">
+          <a:scrgbClr r="0" g="0" b="0"/>
+        </a:effectRef>
         <a:fontRef idx="none"/>
       </a:style>
     </a:lnDef>
@@ -5780,7 +5803,7 @@
         <a:effectLst/>
         <a:sp3d/>
       </a:spPr>
-      <a:bodyPr rot="0" spcFirstLastPara="1" vertOverflow="overflow" horzOverflow="overflow" vert="horz" wrap="square" lIns="50800" tIns="50800" rIns="50800" bIns="50800" numCol="1" spcCol="38100" rtlCol="0" anchor="ctr" upright="0">
+      <a:bodyPr rot="0" spcFirstLastPara="1" vertOverflow="overflow" horzOverflow="overflow" vert="horz" wrap="square" lIns="50800" tIns="50800" rIns="50800" bIns="50800" numCol="1" spcCol="38100" rtlCol="0" anchor="ctr">
         <a:spAutoFit/>
       </a:bodyPr>
       <a:lstStyle>
@@ -5799,7 +5822,7 @@
           <a:buFontTx/>
           <a:buNone/>
           <a:tabLst/>
-          <a:defRPr b="0" baseline="0" cap="none" i="0" spc="0" strike="noStrike" sz="4200" u="none" kumimoji="0" normalizeH="0">
+          <a:defRPr kumimoji="0" sz="4200" b="0" i="0" u="none" strike="noStrike" cap="none" spc="0" normalizeH="0" baseline="0">
             <a:ln>
               <a:noFill/>
             </a:ln>
@@ -5807,7 +5830,7 @@
               <a:srgbClr val="FFFFFF"/>
             </a:solidFill>
             <a:effectLst>
-              <a:outerShdw sx="100000" sy="100000" kx="0" ky="0" algn="b" rotWithShape="0" blurRad="50800" dist="38100" dir="5400000">
+              <a:outerShdw blurRad="50800" dist="38100" dir="5400000" rotWithShape="0">
                 <a:srgbClr val="000000"/>
               </a:outerShdw>
             </a:effectLst>
@@ -5833,7 +5856,7 @@
           <a:buFontTx/>
           <a:buNone/>
           <a:tabLst/>
-          <a:defRPr b="0" baseline="0" cap="none" i="0" spc="0" strike="noStrike" sz="1800" u="none" kumimoji="0" normalizeH="0">
+          <a:defRPr kumimoji="0" sz="1800" b="0" i="0" u="none" strike="noStrike" cap="none" spc="0" normalizeH="0" baseline="0">
             <a:ln>
               <a:noFill/>
             </a:ln>
@@ -5859,7 +5882,7 @@
           <a:buFontTx/>
           <a:buNone/>
           <a:tabLst/>
-          <a:defRPr b="0" baseline="0" cap="none" i="0" spc="0" strike="noStrike" sz="1800" u="none" kumimoji="0" normalizeH="0">
+          <a:defRPr kumimoji="0" sz="1800" b="0" i="0" u="none" strike="noStrike" cap="none" spc="0" normalizeH="0" baseline="0">
             <a:ln>
               <a:noFill/>
             </a:ln>
@@ -5885,7 +5908,7 @@
           <a:buFontTx/>
           <a:buNone/>
           <a:tabLst/>
-          <a:defRPr b="0" baseline="0" cap="none" i="0" spc="0" strike="noStrike" sz="1800" u="none" kumimoji="0" normalizeH="0">
+          <a:defRPr kumimoji="0" sz="1800" b="0" i="0" u="none" strike="noStrike" cap="none" spc="0" normalizeH="0" baseline="0">
             <a:ln>
               <a:noFill/>
             </a:ln>
@@ -5911,7 +5934,7 @@
           <a:buFontTx/>
           <a:buNone/>
           <a:tabLst/>
-          <a:defRPr b="0" baseline="0" cap="none" i="0" spc="0" strike="noStrike" sz="1800" u="none" kumimoji="0" normalizeH="0">
+          <a:defRPr kumimoji="0" sz="1800" b="0" i="0" u="none" strike="noStrike" cap="none" spc="0" normalizeH="0" baseline="0">
             <a:ln>
               <a:noFill/>
             </a:ln>
@@ -5937,7 +5960,7 @@
           <a:buFontTx/>
           <a:buNone/>
           <a:tabLst/>
-          <a:defRPr b="0" baseline="0" cap="none" i="0" spc="0" strike="noStrike" sz="1800" u="none" kumimoji="0" normalizeH="0">
+          <a:defRPr kumimoji="0" sz="1800" b="0" i="0" u="none" strike="noStrike" cap="none" spc="0" normalizeH="0" baseline="0">
             <a:ln>
               <a:noFill/>
             </a:ln>
@@ -5963,7 +5986,7 @@
           <a:buFontTx/>
           <a:buNone/>
           <a:tabLst/>
-          <a:defRPr b="0" baseline="0" cap="none" i="0" spc="0" strike="noStrike" sz="1800" u="none" kumimoji="0" normalizeH="0">
+          <a:defRPr kumimoji="0" sz="1800" b="0" i="0" u="none" strike="noStrike" cap="none" spc="0" normalizeH="0" baseline="0">
             <a:ln>
               <a:noFill/>
             </a:ln>
@@ -5989,7 +6012,7 @@
           <a:buFontTx/>
           <a:buNone/>
           <a:tabLst/>
-          <a:defRPr b="0" baseline="0" cap="none" i="0" spc="0" strike="noStrike" sz="1800" u="none" kumimoji="0" normalizeH="0">
+          <a:defRPr kumimoji="0" sz="1800" b="0" i="0" u="none" strike="noStrike" cap="none" spc="0" normalizeH="0" baseline="0">
             <a:ln>
               <a:noFill/>
             </a:ln>
@@ -6015,7 +6038,7 @@
           <a:buFontTx/>
           <a:buNone/>
           <a:tabLst/>
-          <a:defRPr b="0" baseline="0" cap="none" i="0" spc="0" strike="noStrike" sz="1800" u="none" kumimoji="0" normalizeH="0">
+          <a:defRPr kumimoji="0" sz="1800" b="0" i="0" u="none" strike="noStrike" cap="none" spc="0" normalizeH="0" baseline="0">
             <a:ln>
               <a:noFill/>
             </a:ln>
@@ -6041,7 +6064,7 @@
           <a:buFontTx/>
           <a:buNone/>
           <a:tabLst/>
-          <a:defRPr b="0" baseline="0" cap="none" i="0" spc="0" strike="noStrike" sz="1800" u="none" kumimoji="0" normalizeH="0">
+          <a:defRPr kumimoji="0" sz="1800" b="0" i="0" u="none" strike="noStrike" cap="none" spc="0" normalizeH="0" baseline="0">
             <a:ln>
               <a:noFill/>
             </a:ln>
@@ -6054,18 +6077,25 @@
         </a:lvl9pPr>
       </a:lstStyle>
       <a:style>
-        <a:lnRef idx="0"/>
-        <a:fillRef idx="0"/>
-        <a:effectRef idx="0"/>
+        <a:lnRef idx="0">
+          <a:scrgbClr r="0" g="0" b="0"/>
+        </a:lnRef>
+        <a:fillRef idx="0">
+          <a:scrgbClr r="0" g="0" b="0"/>
+        </a:fillRef>
+        <a:effectRef idx="0">
+          <a:scrgbClr r="0" g="0" b="0"/>
+        </a:effectRef>
         <a:fontRef idx="none"/>
       </a:style>
     </a:txDef>
   </a:objectDefaults>
+  <a:extraClrSchemeLst/>
 </a:theme>
 </file>
 
 <file path=ppt/theme/theme2.xml><?xml version="1.0" encoding="utf-8"?>
-<a:theme xmlns:a="http://schemas.openxmlformats.org/drawingml/2006/main" xmlns:r="http://schemas.openxmlformats.org/officeDocument/2006/relationships" name="Industrial">
+<a:theme xmlns:a="http://schemas.openxmlformats.org/drawingml/2006/main" name="Industrial">
   <a:themeElements>
     <a:clrScheme name="Industrial">
       <a:dk1>
@@ -6255,8 +6285,8 @@
     <a:spDef>
       <a:spPr>
         <a:blipFill rotWithShape="1">
-          <a:blip r:embed="rId1"/>
-          <a:srcRect l="0" t="0" r="0" b="0"/>
+          <a:blip xmlns:r="http://schemas.openxmlformats.org/officeDocument/2006/relationships" r:embed="rId1"/>
+          <a:srcRect/>
           <a:tile tx="0" ty="0" sx="100000" sy="100000" flip="none" algn="tl"/>
         </a:blipFill>
         <a:ln w="12700" cap="flat">
@@ -6266,7 +6296,7 @@
         <a:effectLst/>
         <a:sp3d/>
       </a:spPr>
-      <a:bodyPr rot="0" spcFirstLastPara="1" vertOverflow="overflow" horzOverflow="overflow" vert="horz" wrap="square" lIns="50800" tIns="50800" rIns="50800" bIns="50800" numCol="1" spcCol="38100" rtlCol="0" anchor="ctr" upright="0">
+      <a:bodyPr rot="0" spcFirstLastPara="1" vertOverflow="overflow" horzOverflow="overflow" vert="horz" wrap="square" lIns="50800" tIns="50800" rIns="50800" bIns="50800" numCol="1" spcCol="38100" rtlCol="0" anchor="ctr">
         <a:spAutoFit/>
       </a:bodyPr>
       <a:lstStyle>
@@ -6285,7 +6315,7 @@
           <a:buFontTx/>
           <a:buNone/>
           <a:tabLst/>
-          <a:defRPr b="0" baseline="0" cap="none" i="0" spc="0" strike="noStrike" sz="3600" u="none" kumimoji="0" normalizeH="0">
+          <a:defRPr kumimoji="0" sz="3600" b="0" i="0" u="none" strike="noStrike" cap="none" spc="0" normalizeH="0" baseline="0">
             <a:ln>
               <a:noFill/>
             </a:ln>
@@ -6293,7 +6323,7 @@
               <a:srgbClr val="FFFFFF"/>
             </a:solidFill>
             <a:effectLst>
-              <a:outerShdw sx="100000" sy="100000" kx="0" ky="0" algn="b" rotWithShape="0" blurRad="50800" dist="38100" dir="5400000">
+              <a:outerShdw blurRad="50800" dist="38100" dir="5400000" rotWithShape="0">
                 <a:srgbClr val="000000"/>
               </a:outerShdw>
             </a:effectLst>
@@ -6319,7 +6349,7 @@
           <a:buFontTx/>
           <a:buNone/>
           <a:tabLst/>
-          <a:defRPr b="0" baseline="0" cap="none" i="0" spc="0" strike="noStrike" sz="1800" u="none" kumimoji="0" normalizeH="0">
+          <a:defRPr kumimoji="0" sz="1800" b="0" i="0" u="none" strike="noStrike" cap="none" spc="0" normalizeH="0" baseline="0">
             <a:ln>
               <a:noFill/>
             </a:ln>
@@ -6345,7 +6375,7 @@
           <a:buFontTx/>
           <a:buNone/>
           <a:tabLst/>
-          <a:defRPr b="0" baseline="0" cap="none" i="0" spc="0" strike="noStrike" sz="1800" u="none" kumimoji="0" normalizeH="0">
+          <a:defRPr kumimoji="0" sz="1800" b="0" i="0" u="none" strike="noStrike" cap="none" spc="0" normalizeH="0" baseline="0">
             <a:ln>
               <a:noFill/>
             </a:ln>
@@ -6371,7 +6401,7 @@
           <a:buFontTx/>
           <a:buNone/>
           <a:tabLst/>
-          <a:defRPr b="0" baseline="0" cap="none" i="0" spc="0" strike="noStrike" sz="1800" u="none" kumimoji="0" normalizeH="0">
+          <a:defRPr kumimoji="0" sz="1800" b="0" i="0" u="none" strike="noStrike" cap="none" spc="0" normalizeH="0" baseline="0">
             <a:ln>
               <a:noFill/>
             </a:ln>
@@ -6397,7 +6427,7 @@
           <a:buFontTx/>
           <a:buNone/>
           <a:tabLst/>
-          <a:defRPr b="0" baseline="0" cap="none" i="0" spc="0" strike="noStrike" sz="1800" u="none" kumimoji="0" normalizeH="0">
+          <a:defRPr kumimoji="0" sz="1800" b="0" i="0" u="none" strike="noStrike" cap="none" spc="0" normalizeH="0" baseline="0">
             <a:ln>
               <a:noFill/>
             </a:ln>
@@ -6423,7 +6453,7 @@
           <a:buFontTx/>
           <a:buNone/>
           <a:tabLst/>
-          <a:defRPr b="0" baseline="0" cap="none" i="0" spc="0" strike="noStrike" sz="1800" u="none" kumimoji="0" normalizeH="0">
+          <a:defRPr kumimoji="0" sz="1800" b="0" i="0" u="none" strike="noStrike" cap="none" spc="0" normalizeH="0" baseline="0">
             <a:ln>
               <a:noFill/>
             </a:ln>
@@ -6449,7 +6479,7 @@
           <a:buFontTx/>
           <a:buNone/>
           <a:tabLst/>
-          <a:defRPr b="0" baseline="0" cap="none" i="0" spc="0" strike="noStrike" sz="1800" u="none" kumimoji="0" normalizeH="0">
+          <a:defRPr kumimoji="0" sz="1800" b="0" i="0" u="none" strike="noStrike" cap="none" spc="0" normalizeH="0" baseline="0">
             <a:ln>
               <a:noFill/>
             </a:ln>
@@ -6475,7 +6505,7 @@
           <a:buFontTx/>
           <a:buNone/>
           <a:tabLst/>
-          <a:defRPr b="0" baseline="0" cap="none" i="0" spc="0" strike="noStrike" sz="1800" u="none" kumimoji="0" normalizeH="0">
+          <a:defRPr kumimoji="0" sz="1800" b="0" i="0" u="none" strike="noStrike" cap="none" spc="0" normalizeH="0" baseline="0">
             <a:ln>
               <a:noFill/>
             </a:ln>
@@ -6501,7 +6531,7 @@
           <a:buFontTx/>
           <a:buNone/>
           <a:tabLst/>
-          <a:defRPr b="0" baseline="0" cap="none" i="0" spc="0" strike="noStrike" sz="1800" u="none" kumimoji="0" normalizeH="0">
+          <a:defRPr kumimoji="0" sz="1800" b="0" i="0" u="none" strike="noStrike" cap="none" spc="0" normalizeH="0" baseline="0">
             <a:ln>
               <a:noFill/>
             </a:ln>
@@ -6527,7 +6557,7 @@
           <a:buFontTx/>
           <a:buNone/>
           <a:tabLst/>
-          <a:defRPr b="0" baseline="0" cap="none" i="0" spc="0" strike="noStrike" sz="1800" u="none" kumimoji="0" normalizeH="0">
+          <a:defRPr kumimoji="0" sz="1800" b="0" i="0" u="none" strike="noStrike" cap="none" spc="0" normalizeH="0" baseline="0">
             <a:ln>
               <a:noFill/>
             </a:ln>
@@ -6540,9 +6570,15 @@
         </a:lvl9pPr>
       </a:lstStyle>
       <a:style>
-        <a:lnRef idx="0"/>
-        <a:fillRef idx="0"/>
-        <a:effectRef idx="0"/>
+        <a:lnRef idx="0">
+          <a:scrgbClr r="0" g="0" b="0"/>
+        </a:lnRef>
+        <a:fillRef idx="0">
+          <a:scrgbClr r="0" g="0" b="0"/>
+        </a:fillRef>
+        <a:effectRef idx="0">
+          <a:scrgbClr r="0" g="0" b="0"/>
+        </a:effectRef>
         <a:fontRef idx="none"/>
       </a:style>
     </a:spDef>
@@ -6559,7 +6595,7 @@
         <a:effectLst/>
         <a:sp3d/>
       </a:spPr>
-      <a:bodyPr rot="0" spcFirstLastPara="1" vertOverflow="overflow" horzOverflow="overflow" vert="horz" wrap="square" lIns="91439" tIns="45719" rIns="91439" bIns="45719" numCol="1" spcCol="38100" rtlCol="0" anchor="t" upright="0">
+      <a:bodyPr rot="0" spcFirstLastPara="1" vertOverflow="overflow" horzOverflow="overflow" vert="horz" wrap="square" lIns="91439" tIns="45719" rIns="91439" bIns="45719" numCol="1" spcCol="38100" rtlCol="0" anchor="t">
         <a:noAutofit/>
       </a:bodyPr>
       <a:lstStyle>
@@ -6578,7 +6614,7 @@
           <a:buFontTx/>
           <a:buNone/>
           <a:tabLst/>
-          <a:defRPr b="0" baseline="0" cap="none" i="0" spc="0" strike="noStrike" sz="1800" u="none" kumimoji="0" normalizeH="0">
+          <a:defRPr kumimoji="0" sz="1800" b="0" i="0" u="none" strike="noStrike" cap="none" spc="0" normalizeH="0" baseline="0">
             <a:ln>
               <a:noFill/>
             </a:ln>
@@ -6604,7 +6640,7 @@
           <a:buFontTx/>
           <a:buNone/>
           <a:tabLst/>
-          <a:defRPr b="0" baseline="0" cap="none" i="0" spc="0" strike="noStrike" sz="1800" u="none" kumimoji="0" normalizeH="0">
+          <a:defRPr kumimoji="0" sz="1800" b="0" i="0" u="none" strike="noStrike" cap="none" spc="0" normalizeH="0" baseline="0">
             <a:ln>
               <a:noFill/>
             </a:ln>
@@ -6630,7 +6666,7 @@
           <a:buFontTx/>
           <a:buNone/>
           <a:tabLst/>
-          <a:defRPr b="0" baseline="0" cap="none" i="0" spc="0" strike="noStrike" sz="1800" u="none" kumimoji="0" normalizeH="0">
+          <a:defRPr kumimoji="0" sz="1800" b="0" i="0" u="none" strike="noStrike" cap="none" spc="0" normalizeH="0" baseline="0">
             <a:ln>
               <a:noFill/>
             </a:ln>
@@ -6656,7 +6692,7 @@
           <a:buFontTx/>
           <a:buNone/>
           <a:tabLst/>
-          <a:defRPr b="0" baseline="0" cap="none" i="0" spc="0" strike="noStrike" sz="1800" u="none" kumimoji="0" normalizeH="0">
+          <a:defRPr kumimoji="0" sz="1800" b="0" i="0" u="none" strike="noStrike" cap="none" spc="0" normalizeH="0" baseline="0">
             <a:ln>
               <a:noFill/>
             </a:ln>
@@ -6682,7 +6718,7 @@
           <a:buFontTx/>
           <a:buNone/>
           <a:tabLst/>
-          <a:defRPr b="0" baseline="0" cap="none" i="0" spc="0" strike="noStrike" sz="1800" u="none" kumimoji="0" normalizeH="0">
+          <a:defRPr kumimoji="0" sz="1800" b="0" i="0" u="none" strike="noStrike" cap="none" spc="0" normalizeH="0" baseline="0">
             <a:ln>
               <a:noFill/>
             </a:ln>
@@ -6708,7 +6744,7 @@
           <a:buFontTx/>
           <a:buNone/>
           <a:tabLst/>
-          <a:defRPr b="0" baseline="0" cap="none" i="0" spc="0" strike="noStrike" sz="1800" u="none" kumimoji="0" normalizeH="0">
+          <a:defRPr kumimoji="0" sz="1800" b="0" i="0" u="none" strike="noStrike" cap="none" spc="0" normalizeH="0" baseline="0">
             <a:ln>
               <a:noFill/>
             </a:ln>
@@ -6734,7 +6770,7 @@
           <a:buFontTx/>
           <a:buNone/>
           <a:tabLst/>
-          <a:defRPr b="0" baseline="0" cap="none" i="0" spc="0" strike="noStrike" sz="1800" u="none" kumimoji="0" normalizeH="0">
+          <a:defRPr kumimoji="0" sz="1800" b="0" i="0" u="none" strike="noStrike" cap="none" spc="0" normalizeH="0" baseline="0">
             <a:ln>
               <a:noFill/>
             </a:ln>
@@ -6760,7 +6796,7 @@
           <a:buFontTx/>
           <a:buNone/>
           <a:tabLst/>
-          <a:defRPr b="0" baseline="0" cap="none" i="0" spc="0" strike="noStrike" sz="1800" u="none" kumimoji="0" normalizeH="0">
+          <a:defRPr kumimoji="0" sz="1800" b="0" i="0" u="none" strike="noStrike" cap="none" spc="0" normalizeH="0" baseline="0">
             <a:ln>
               <a:noFill/>
             </a:ln>
@@ -6786,7 +6822,7 @@
           <a:buFontTx/>
           <a:buNone/>
           <a:tabLst/>
-          <a:defRPr b="0" baseline="0" cap="none" i="0" spc="0" strike="noStrike" sz="1800" u="none" kumimoji="0" normalizeH="0">
+          <a:defRPr kumimoji="0" sz="1800" b="0" i="0" u="none" strike="noStrike" cap="none" spc="0" normalizeH="0" baseline="0">
             <a:ln>
               <a:noFill/>
             </a:ln>
@@ -6812,7 +6848,7 @@
           <a:buFontTx/>
           <a:buNone/>
           <a:tabLst/>
-          <a:defRPr b="0" baseline="0" cap="none" i="0" spc="0" strike="noStrike" sz="1800" u="none" kumimoji="0" normalizeH="0">
+          <a:defRPr kumimoji="0" sz="1800" b="0" i="0" u="none" strike="noStrike" cap="none" spc="0" normalizeH="0" baseline="0">
             <a:ln>
               <a:noFill/>
             </a:ln>
@@ -6825,9 +6861,15 @@
         </a:lvl9pPr>
       </a:lstStyle>
       <a:style>
-        <a:lnRef idx="0"/>
-        <a:fillRef idx="0"/>
-        <a:effectRef idx="0"/>
+        <a:lnRef idx="0">
+          <a:scrgbClr r="0" g="0" b="0"/>
+        </a:lnRef>
+        <a:fillRef idx="0">
+          <a:scrgbClr r="0" g="0" b="0"/>
+        </a:fillRef>
+        <a:effectRef idx="0">
+          <a:scrgbClr r="0" g="0" b="0"/>
+        </a:effectRef>
         <a:fontRef idx="none"/>
       </a:style>
     </a:lnDef>
@@ -6841,7 +6883,7 @@
         <a:effectLst/>
         <a:sp3d/>
       </a:spPr>
-      <a:bodyPr rot="0" spcFirstLastPara="1" vertOverflow="overflow" horzOverflow="overflow" vert="horz" wrap="square" lIns="50800" tIns="50800" rIns="50800" bIns="50800" numCol="1" spcCol="38100" rtlCol="0" anchor="ctr" upright="0">
+      <a:bodyPr rot="0" spcFirstLastPara="1" vertOverflow="overflow" horzOverflow="overflow" vert="horz" wrap="square" lIns="50800" tIns="50800" rIns="50800" bIns="50800" numCol="1" spcCol="38100" rtlCol="0" anchor="ctr">
         <a:spAutoFit/>
       </a:bodyPr>
       <a:lstStyle>
@@ -6860,7 +6902,7 @@
           <a:buFontTx/>
           <a:buNone/>
           <a:tabLst/>
-          <a:defRPr b="0" baseline="0" cap="none" i="0" spc="0" strike="noStrike" sz="4200" u="none" kumimoji="0" normalizeH="0">
+          <a:defRPr kumimoji="0" sz="4200" b="0" i="0" u="none" strike="noStrike" cap="none" spc="0" normalizeH="0" baseline="0">
             <a:ln>
               <a:noFill/>
             </a:ln>
@@ -6868,7 +6910,7 @@
               <a:srgbClr val="FFFFFF"/>
             </a:solidFill>
             <a:effectLst>
-              <a:outerShdw sx="100000" sy="100000" kx="0" ky="0" algn="b" rotWithShape="0" blurRad="50800" dist="38100" dir="5400000">
+              <a:outerShdw blurRad="50800" dist="38100" dir="5400000" rotWithShape="0">
                 <a:srgbClr val="000000"/>
               </a:outerShdw>
             </a:effectLst>
@@ -6894,7 +6936,7 @@
           <a:buFontTx/>
           <a:buNone/>
           <a:tabLst/>
-          <a:defRPr b="0" baseline="0" cap="none" i="0" spc="0" strike="noStrike" sz="1800" u="none" kumimoji="0" normalizeH="0">
+          <a:defRPr kumimoji="0" sz="1800" b="0" i="0" u="none" strike="noStrike" cap="none" spc="0" normalizeH="0" baseline="0">
             <a:ln>
               <a:noFill/>
             </a:ln>
@@ -6920,7 +6962,7 @@
           <a:buFontTx/>
           <a:buNone/>
           <a:tabLst/>
-          <a:defRPr b="0" baseline="0" cap="none" i="0" spc="0" strike="noStrike" sz="1800" u="none" kumimoji="0" normalizeH="0">
+          <a:defRPr kumimoji="0" sz="1800" b="0" i="0" u="none" strike="noStrike" cap="none" spc="0" normalizeH="0" baseline="0">
             <a:ln>
               <a:noFill/>
             </a:ln>
@@ -6946,7 +6988,7 @@
           <a:buFontTx/>
           <a:buNone/>
           <a:tabLst/>
-          <a:defRPr b="0" baseline="0" cap="none" i="0" spc="0" strike="noStrike" sz="1800" u="none" kumimoji="0" normalizeH="0">
+          <a:defRPr kumimoji="0" sz="1800" b="0" i="0" u="none" strike="noStrike" cap="none" spc="0" normalizeH="0" baseline="0">
             <a:ln>
               <a:noFill/>
             </a:ln>
@@ -6972,7 +7014,7 @@
           <a:buFontTx/>
           <a:buNone/>
           <a:tabLst/>
-          <a:defRPr b="0" baseline="0" cap="none" i="0" spc="0" strike="noStrike" sz="1800" u="none" kumimoji="0" normalizeH="0">
+          <a:defRPr kumimoji="0" sz="1800" b="0" i="0" u="none" strike="noStrike" cap="none" spc="0" normalizeH="0" baseline="0">
             <a:ln>
               <a:noFill/>
             </a:ln>
@@ -6998,7 +7040,7 @@
           <a:buFontTx/>
           <a:buNone/>
           <a:tabLst/>
-          <a:defRPr b="0" baseline="0" cap="none" i="0" spc="0" strike="noStrike" sz="1800" u="none" kumimoji="0" normalizeH="0">
+          <a:defRPr kumimoji="0" sz="1800" b="0" i="0" u="none" strike="noStrike" cap="none" spc="0" normalizeH="0" baseline="0">
             <a:ln>
               <a:noFill/>
             </a:ln>
@@ -7024,7 +7066,7 @@
           <a:buFontTx/>
           <a:buNone/>
           <a:tabLst/>
-          <a:defRPr b="0" baseline="0" cap="none" i="0" spc="0" strike="noStrike" sz="1800" u="none" kumimoji="0" normalizeH="0">
+          <a:defRPr kumimoji="0" sz="1800" b="0" i="0" u="none" strike="noStrike" cap="none" spc="0" normalizeH="0" baseline="0">
             <a:ln>
               <a:noFill/>
             </a:ln>
@@ -7050,7 +7092,7 @@
           <a:buFontTx/>
           <a:buNone/>
           <a:tabLst/>
-          <a:defRPr b="0" baseline="0" cap="none" i="0" spc="0" strike="noStrike" sz="1800" u="none" kumimoji="0" normalizeH="0">
+          <a:defRPr kumimoji="0" sz="1800" b="0" i="0" u="none" strike="noStrike" cap="none" spc="0" normalizeH="0" baseline="0">
             <a:ln>
               <a:noFill/>
             </a:ln>
@@ -7076,7 +7118,7 @@
           <a:buFontTx/>
           <a:buNone/>
           <a:tabLst/>
-          <a:defRPr b="0" baseline="0" cap="none" i="0" spc="0" strike="noStrike" sz="1800" u="none" kumimoji="0" normalizeH="0">
+          <a:defRPr kumimoji="0" sz="1800" b="0" i="0" u="none" strike="noStrike" cap="none" spc="0" normalizeH="0" baseline="0">
             <a:ln>
               <a:noFill/>
             </a:ln>
@@ -7102,7 +7144,7 @@
           <a:buFontTx/>
           <a:buNone/>
           <a:tabLst/>
-          <a:defRPr b="0" baseline="0" cap="none" i="0" spc="0" strike="noStrike" sz="1800" u="none" kumimoji="0" normalizeH="0">
+          <a:defRPr kumimoji="0" sz="1800" b="0" i="0" u="none" strike="noStrike" cap="none" spc="0" normalizeH="0" baseline="0">
             <a:ln>
               <a:noFill/>
             </a:ln>
@@ -7115,12 +7157,19 @@
         </a:lvl9pPr>
       </a:lstStyle>
       <a:style>
-        <a:lnRef idx="0"/>
-        <a:fillRef idx="0"/>
-        <a:effectRef idx="0"/>
+        <a:lnRef idx="0">
+          <a:scrgbClr r="0" g="0" b="0"/>
+        </a:lnRef>
+        <a:fillRef idx="0">
+          <a:scrgbClr r="0" g="0" b="0"/>
+        </a:fillRef>
+        <a:effectRef idx="0">
+          <a:scrgbClr r="0" g="0" b="0"/>
+        </a:effectRef>
         <a:fontRef idx="none"/>
       </a:style>
     </a:txDef>
   </a:objectDefaults>
+  <a:extraClrSchemeLst/>
 </a:theme>
 </file>
</xml_diff>